<commit_message>
Finished System Protection + Spell Check
</commit_message>
<xml_diff>
--- a/Lecture/Lecture.pptx
+++ b/Lecture/Lecture.pptx
@@ -5,7 +5,7 @@
     <p:sldMasterId id="2147483660" r:id="rId1"/>
   </p:sldMasterIdLst>
   <p:notesMasterIdLst>
-    <p:notesMasterId r:id="rId32"/>
+    <p:notesMasterId r:id="rId37"/>
   </p:notesMasterIdLst>
   <p:sldIdLst>
     <p:sldId id="256" r:id="rId2"/>
@@ -37,7 +37,12 @@
     <p:sldId id="304" r:id="rId28"/>
     <p:sldId id="306" r:id="rId29"/>
     <p:sldId id="305" r:id="rId30"/>
-    <p:sldId id="278" r:id="rId31"/>
+    <p:sldId id="307" r:id="rId31"/>
+    <p:sldId id="308" r:id="rId32"/>
+    <p:sldId id="309" r:id="rId33"/>
+    <p:sldId id="310" r:id="rId34"/>
+    <p:sldId id="311" r:id="rId35"/>
+    <p:sldId id="278" r:id="rId36"/>
   </p:sldIdLst>
   <p:sldSz cx="12192000" cy="6858000"/>
   <p:notesSz cx="6858000" cy="9144000"/>
@@ -2505,7 +2510,10 @@
           <a:bodyPr/>
           <a:lstStyle/>
           <a:p>
-            <a:endParaRPr lang="en-IL" dirty="0"/>
+            <a:r>
+              <a:rPr lang="en-US" dirty="0"/>
+              <a:t>Echo Server</a:t>
+            </a:r>
           </a:p>
         </p:txBody>
       </p:sp>
@@ -2527,6 +2535,426 @@
             <a:fld id="{FA19A2CC-002F-40A3-8085-9B94163C320C}" type="slidenum">
               <a:rPr lang="en-IL" smtClean="0"/>
               <a:t>30</a:t>
+            </a:fld>
+            <a:endParaRPr lang="en-IL"/>
+          </a:p>
+        </p:txBody>
+      </p:sp>
+    </p:spTree>
+    <p:extLst>
+      <p:ext uri="{BB962C8B-B14F-4D97-AF65-F5344CB8AC3E}">
+        <p14:creationId xmlns:p14="http://schemas.microsoft.com/office/powerpoint/2010/main" val="3805921707"/>
+      </p:ext>
+    </p:extLst>
+  </p:cSld>
+  <p:clrMapOvr>
+    <a:masterClrMapping/>
+  </p:clrMapOvr>
+</p:notes>
+</file>
+
+<file path=ppt/notesSlides/notesSlide31.xml><?xml version="1.0" encoding="utf-8"?>
+<p:notes xmlns:a="http://schemas.openxmlformats.org/drawingml/2006/main" xmlns:r="http://schemas.openxmlformats.org/officeDocument/2006/relationships" xmlns:p="http://schemas.openxmlformats.org/presentationml/2006/main">
+  <p:cSld>
+    <p:spTree>
+      <p:nvGrpSpPr>
+        <p:cNvPr id="1" name=""/>
+        <p:cNvGrpSpPr/>
+        <p:nvPr/>
+      </p:nvGrpSpPr>
+      <p:grpSpPr>
+        <a:xfrm>
+          <a:off x="0" y="0"/>
+          <a:ext cx="0" cy="0"/>
+          <a:chOff x="0" y="0"/>
+          <a:chExt cx="0" cy="0"/>
+        </a:xfrm>
+      </p:grpSpPr>
+      <p:sp>
+        <p:nvSpPr>
+          <p:cNvPr id="2" name="Slide Image Placeholder 1"/>
+          <p:cNvSpPr>
+            <a:spLocks noGrp="1" noRot="1" noChangeAspect="1"/>
+          </p:cNvSpPr>
+          <p:nvPr>
+            <p:ph type="sldImg"/>
+          </p:nvPr>
+        </p:nvSpPr>
+        <p:spPr/>
+      </p:sp>
+      <p:sp>
+        <p:nvSpPr>
+          <p:cNvPr id="3" name="Notes Placeholder 2"/>
+          <p:cNvSpPr>
+            <a:spLocks noGrp="1"/>
+          </p:cNvSpPr>
+          <p:nvPr>
+            <p:ph type="body" idx="1"/>
+          </p:nvPr>
+        </p:nvSpPr>
+        <p:spPr/>
+        <p:txBody>
+          <a:bodyPr/>
+          <a:lstStyle/>
+          <a:p>
+            <a:endParaRPr lang="en-IL" dirty="0"/>
+          </a:p>
+        </p:txBody>
+      </p:sp>
+      <p:sp>
+        <p:nvSpPr>
+          <p:cNvPr id="4" name="Slide Number Placeholder 3"/>
+          <p:cNvSpPr>
+            <a:spLocks noGrp="1"/>
+          </p:cNvSpPr>
+          <p:nvPr>
+            <p:ph type="sldNum" sz="quarter" idx="5"/>
+          </p:nvPr>
+        </p:nvSpPr>
+        <p:spPr/>
+        <p:txBody>
+          <a:bodyPr/>
+          <a:lstStyle/>
+          <a:p>
+            <a:fld id="{FA19A2CC-002F-40A3-8085-9B94163C320C}" type="slidenum">
+              <a:rPr lang="en-IL" smtClean="0"/>
+              <a:t>31</a:t>
+            </a:fld>
+            <a:endParaRPr lang="en-IL"/>
+          </a:p>
+        </p:txBody>
+      </p:sp>
+    </p:spTree>
+    <p:extLst>
+      <p:ext uri="{BB962C8B-B14F-4D97-AF65-F5344CB8AC3E}">
+        <p14:creationId xmlns:p14="http://schemas.microsoft.com/office/powerpoint/2010/main" val="3196954493"/>
+      </p:ext>
+    </p:extLst>
+  </p:cSld>
+  <p:clrMapOvr>
+    <a:masterClrMapping/>
+  </p:clrMapOvr>
+</p:notes>
+</file>
+
+<file path=ppt/notesSlides/notesSlide32.xml><?xml version="1.0" encoding="utf-8"?>
+<p:notes xmlns:a="http://schemas.openxmlformats.org/drawingml/2006/main" xmlns:r="http://schemas.openxmlformats.org/officeDocument/2006/relationships" xmlns:p="http://schemas.openxmlformats.org/presentationml/2006/main">
+  <p:cSld>
+    <p:spTree>
+      <p:nvGrpSpPr>
+        <p:cNvPr id="1" name=""/>
+        <p:cNvGrpSpPr/>
+        <p:nvPr/>
+      </p:nvGrpSpPr>
+      <p:grpSpPr>
+        <a:xfrm>
+          <a:off x="0" y="0"/>
+          <a:ext cx="0" cy="0"/>
+          <a:chOff x="0" y="0"/>
+          <a:chExt cx="0" cy="0"/>
+        </a:xfrm>
+      </p:grpSpPr>
+      <p:sp>
+        <p:nvSpPr>
+          <p:cNvPr id="2" name="Slide Image Placeholder 1"/>
+          <p:cNvSpPr>
+            <a:spLocks noGrp="1" noRot="1" noChangeAspect="1"/>
+          </p:cNvSpPr>
+          <p:nvPr>
+            <p:ph type="sldImg"/>
+          </p:nvPr>
+        </p:nvSpPr>
+        <p:spPr/>
+      </p:sp>
+      <p:sp>
+        <p:nvSpPr>
+          <p:cNvPr id="3" name="Notes Placeholder 2"/>
+          <p:cNvSpPr>
+            <a:spLocks noGrp="1"/>
+          </p:cNvSpPr>
+          <p:nvPr>
+            <p:ph type="body" idx="1"/>
+          </p:nvPr>
+        </p:nvSpPr>
+        <p:spPr/>
+        <p:txBody>
+          <a:bodyPr/>
+          <a:lstStyle/>
+          <a:p>
+            <a:endParaRPr lang="en-IL" dirty="0"/>
+          </a:p>
+        </p:txBody>
+      </p:sp>
+      <p:sp>
+        <p:nvSpPr>
+          <p:cNvPr id="4" name="Slide Number Placeholder 3"/>
+          <p:cNvSpPr>
+            <a:spLocks noGrp="1"/>
+          </p:cNvSpPr>
+          <p:nvPr>
+            <p:ph type="sldNum" sz="quarter" idx="5"/>
+          </p:nvPr>
+        </p:nvSpPr>
+        <p:spPr/>
+        <p:txBody>
+          <a:bodyPr/>
+          <a:lstStyle/>
+          <a:p>
+            <a:fld id="{FA19A2CC-002F-40A3-8085-9B94163C320C}" type="slidenum">
+              <a:rPr lang="en-IL" smtClean="0"/>
+              <a:t>32</a:t>
+            </a:fld>
+            <a:endParaRPr lang="en-IL"/>
+          </a:p>
+        </p:txBody>
+      </p:sp>
+    </p:spTree>
+    <p:extLst>
+      <p:ext uri="{BB962C8B-B14F-4D97-AF65-F5344CB8AC3E}">
+        <p14:creationId xmlns:p14="http://schemas.microsoft.com/office/powerpoint/2010/main" val="3483446381"/>
+      </p:ext>
+    </p:extLst>
+  </p:cSld>
+  <p:clrMapOvr>
+    <a:masterClrMapping/>
+  </p:clrMapOvr>
+</p:notes>
+</file>
+
+<file path=ppt/notesSlides/notesSlide33.xml><?xml version="1.0" encoding="utf-8"?>
+<p:notes xmlns:a="http://schemas.openxmlformats.org/drawingml/2006/main" xmlns:r="http://schemas.openxmlformats.org/officeDocument/2006/relationships" xmlns:p="http://schemas.openxmlformats.org/presentationml/2006/main">
+  <p:cSld>
+    <p:spTree>
+      <p:nvGrpSpPr>
+        <p:cNvPr id="1" name=""/>
+        <p:cNvGrpSpPr/>
+        <p:nvPr/>
+      </p:nvGrpSpPr>
+      <p:grpSpPr>
+        <a:xfrm>
+          <a:off x="0" y="0"/>
+          <a:ext cx="0" cy="0"/>
+          <a:chOff x="0" y="0"/>
+          <a:chExt cx="0" cy="0"/>
+        </a:xfrm>
+      </p:grpSpPr>
+      <p:sp>
+        <p:nvSpPr>
+          <p:cNvPr id="2" name="Slide Image Placeholder 1"/>
+          <p:cNvSpPr>
+            <a:spLocks noGrp="1" noRot="1" noChangeAspect="1"/>
+          </p:cNvSpPr>
+          <p:nvPr>
+            <p:ph type="sldImg"/>
+          </p:nvPr>
+        </p:nvSpPr>
+        <p:spPr/>
+      </p:sp>
+      <p:sp>
+        <p:nvSpPr>
+          <p:cNvPr id="3" name="Notes Placeholder 2"/>
+          <p:cNvSpPr>
+            <a:spLocks noGrp="1"/>
+          </p:cNvSpPr>
+          <p:nvPr>
+            <p:ph type="body" idx="1"/>
+          </p:nvPr>
+        </p:nvSpPr>
+        <p:spPr/>
+        <p:txBody>
+          <a:bodyPr/>
+          <a:lstStyle/>
+          <a:p>
+            <a:endParaRPr lang="en-IL" dirty="0"/>
+          </a:p>
+        </p:txBody>
+      </p:sp>
+      <p:sp>
+        <p:nvSpPr>
+          <p:cNvPr id="4" name="Slide Number Placeholder 3"/>
+          <p:cNvSpPr>
+            <a:spLocks noGrp="1"/>
+          </p:cNvSpPr>
+          <p:nvPr>
+            <p:ph type="sldNum" sz="quarter" idx="5"/>
+          </p:nvPr>
+        </p:nvSpPr>
+        <p:spPr/>
+        <p:txBody>
+          <a:bodyPr/>
+          <a:lstStyle/>
+          <a:p>
+            <a:fld id="{FA19A2CC-002F-40A3-8085-9B94163C320C}" type="slidenum">
+              <a:rPr lang="en-IL" smtClean="0"/>
+              <a:t>33</a:t>
+            </a:fld>
+            <a:endParaRPr lang="en-IL"/>
+          </a:p>
+        </p:txBody>
+      </p:sp>
+    </p:spTree>
+    <p:extLst>
+      <p:ext uri="{BB962C8B-B14F-4D97-AF65-F5344CB8AC3E}">
+        <p14:creationId xmlns:p14="http://schemas.microsoft.com/office/powerpoint/2010/main" val="4218043440"/>
+      </p:ext>
+    </p:extLst>
+  </p:cSld>
+  <p:clrMapOvr>
+    <a:masterClrMapping/>
+  </p:clrMapOvr>
+</p:notes>
+</file>
+
+<file path=ppt/notesSlides/notesSlide34.xml><?xml version="1.0" encoding="utf-8"?>
+<p:notes xmlns:a="http://schemas.openxmlformats.org/drawingml/2006/main" xmlns:r="http://schemas.openxmlformats.org/officeDocument/2006/relationships" xmlns:p="http://schemas.openxmlformats.org/presentationml/2006/main">
+  <p:cSld>
+    <p:spTree>
+      <p:nvGrpSpPr>
+        <p:cNvPr id="1" name=""/>
+        <p:cNvGrpSpPr/>
+        <p:nvPr/>
+      </p:nvGrpSpPr>
+      <p:grpSpPr>
+        <a:xfrm>
+          <a:off x="0" y="0"/>
+          <a:ext cx="0" cy="0"/>
+          <a:chOff x="0" y="0"/>
+          <a:chExt cx="0" cy="0"/>
+        </a:xfrm>
+      </p:grpSpPr>
+      <p:sp>
+        <p:nvSpPr>
+          <p:cNvPr id="2" name="Slide Image Placeholder 1"/>
+          <p:cNvSpPr>
+            <a:spLocks noGrp="1" noRot="1" noChangeAspect="1"/>
+          </p:cNvSpPr>
+          <p:nvPr>
+            <p:ph type="sldImg"/>
+          </p:nvPr>
+        </p:nvSpPr>
+        <p:spPr/>
+      </p:sp>
+      <p:sp>
+        <p:nvSpPr>
+          <p:cNvPr id="3" name="Notes Placeholder 2"/>
+          <p:cNvSpPr>
+            <a:spLocks noGrp="1"/>
+          </p:cNvSpPr>
+          <p:nvPr>
+            <p:ph type="body" idx="1"/>
+          </p:nvPr>
+        </p:nvSpPr>
+        <p:spPr/>
+        <p:txBody>
+          <a:bodyPr/>
+          <a:lstStyle/>
+          <a:p>
+            <a:endParaRPr lang="en-IL" dirty="0"/>
+          </a:p>
+        </p:txBody>
+      </p:sp>
+      <p:sp>
+        <p:nvSpPr>
+          <p:cNvPr id="4" name="Slide Number Placeholder 3"/>
+          <p:cNvSpPr>
+            <a:spLocks noGrp="1"/>
+          </p:cNvSpPr>
+          <p:nvPr>
+            <p:ph type="sldNum" sz="quarter" idx="5"/>
+          </p:nvPr>
+        </p:nvSpPr>
+        <p:spPr/>
+        <p:txBody>
+          <a:bodyPr/>
+          <a:lstStyle/>
+          <a:p>
+            <a:fld id="{FA19A2CC-002F-40A3-8085-9B94163C320C}" type="slidenum">
+              <a:rPr lang="en-IL" smtClean="0"/>
+              <a:t>34</a:t>
+            </a:fld>
+            <a:endParaRPr lang="en-IL"/>
+          </a:p>
+        </p:txBody>
+      </p:sp>
+    </p:spTree>
+    <p:extLst>
+      <p:ext uri="{BB962C8B-B14F-4D97-AF65-F5344CB8AC3E}">
+        <p14:creationId xmlns:p14="http://schemas.microsoft.com/office/powerpoint/2010/main" val="2100637461"/>
+      </p:ext>
+    </p:extLst>
+  </p:cSld>
+  <p:clrMapOvr>
+    <a:masterClrMapping/>
+  </p:clrMapOvr>
+</p:notes>
+</file>
+
+<file path=ppt/notesSlides/notesSlide35.xml><?xml version="1.0" encoding="utf-8"?>
+<p:notes xmlns:a="http://schemas.openxmlformats.org/drawingml/2006/main" xmlns:r="http://schemas.openxmlformats.org/officeDocument/2006/relationships" xmlns:p="http://schemas.openxmlformats.org/presentationml/2006/main">
+  <p:cSld>
+    <p:spTree>
+      <p:nvGrpSpPr>
+        <p:cNvPr id="1" name=""/>
+        <p:cNvGrpSpPr/>
+        <p:nvPr/>
+      </p:nvGrpSpPr>
+      <p:grpSpPr>
+        <a:xfrm>
+          <a:off x="0" y="0"/>
+          <a:ext cx="0" cy="0"/>
+          <a:chOff x="0" y="0"/>
+          <a:chExt cx="0" cy="0"/>
+        </a:xfrm>
+      </p:grpSpPr>
+      <p:sp>
+        <p:nvSpPr>
+          <p:cNvPr id="2" name="Slide Image Placeholder 1"/>
+          <p:cNvSpPr>
+            <a:spLocks noGrp="1" noRot="1" noChangeAspect="1"/>
+          </p:cNvSpPr>
+          <p:nvPr>
+            <p:ph type="sldImg"/>
+          </p:nvPr>
+        </p:nvSpPr>
+        <p:spPr/>
+      </p:sp>
+      <p:sp>
+        <p:nvSpPr>
+          <p:cNvPr id="3" name="Notes Placeholder 2"/>
+          <p:cNvSpPr>
+            <a:spLocks noGrp="1"/>
+          </p:cNvSpPr>
+          <p:nvPr>
+            <p:ph type="body" idx="1"/>
+          </p:nvPr>
+        </p:nvSpPr>
+        <p:spPr/>
+        <p:txBody>
+          <a:bodyPr/>
+          <a:lstStyle/>
+          <a:p>
+            <a:endParaRPr lang="en-IL" dirty="0"/>
+          </a:p>
+        </p:txBody>
+      </p:sp>
+      <p:sp>
+        <p:nvSpPr>
+          <p:cNvPr id="4" name="Slide Number Placeholder 3"/>
+          <p:cNvSpPr>
+            <a:spLocks noGrp="1"/>
+          </p:cNvSpPr>
+          <p:nvPr>
+            <p:ph type="sldNum" sz="quarter" idx="5"/>
+          </p:nvPr>
+        </p:nvSpPr>
+        <p:spPr/>
+        <p:txBody>
+          <a:bodyPr/>
+          <a:lstStyle/>
+          <a:p>
+            <a:fld id="{FA19A2CC-002F-40A3-8085-9B94163C320C}" type="slidenum">
+              <a:rPr lang="en-IL" smtClean="0"/>
+              <a:t>35</a:t>
             </a:fld>
             <a:endParaRPr lang="en-IL"/>
           </a:p>
@@ -24926,6 +25354,1722 @@
           <a:chExt cx="0" cy="0"/>
         </a:xfrm>
       </p:grpSpPr>
+      <p:sp>
+        <p:nvSpPr>
+          <p:cNvPr id="2" name="Title 1">
+            <a:extLst>
+              <a:ext uri="{FF2B5EF4-FFF2-40B4-BE49-F238E27FC236}">
+                <a16:creationId xmlns:a16="http://schemas.microsoft.com/office/drawing/2014/main" id="{83719985-2CD8-4977-8479-E3A157C3CD9E}"/>
+              </a:ext>
+            </a:extLst>
+          </p:cNvPr>
+          <p:cNvSpPr>
+            <a:spLocks noGrp="1"/>
+          </p:cNvSpPr>
+          <p:nvPr>
+            <p:ph type="ctrTitle"/>
+          </p:nvPr>
+        </p:nvSpPr>
+        <p:spPr/>
+        <p:txBody>
+          <a:bodyPr/>
+          <a:lstStyle/>
+          <a:p>
+            <a:pPr algn="r" rtl="1"/>
+            <a:r>
+              <a:rPr lang="he-IL" cap="none" dirty="0">
+                <a:latin typeface="Segoe UI Semibold" panose="020B0702040204020203" pitchFamily="34" charset="0"/>
+                <a:cs typeface="Segoe UI Semibold" panose="020B0702040204020203" pitchFamily="34" charset="0"/>
+              </a:rPr>
+              <a:t>אבטחת מערכת</a:t>
+            </a:r>
+            <a:endParaRPr lang="en-IL" cap="none" dirty="0">
+              <a:latin typeface="Segoe UI Semibold" panose="020B0702040204020203" pitchFamily="34" charset="0"/>
+              <a:cs typeface="Segoe UI Semibold" panose="020B0702040204020203" pitchFamily="34" charset="0"/>
+            </a:endParaRPr>
+          </a:p>
+        </p:txBody>
+      </p:sp>
+      <p:sp>
+        <p:nvSpPr>
+          <p:cNvPr id="3" name="Subtitle 2">
+            <a:extLst>
+              <a:ext uri="{FF2B5EF4-FFF2-40B4-BE49-F238E27FC236}">
+                <a16:creationId xmlns:a16="http://schemas.microsoft.com/office/drawing/2014/main" id="{64BE32D0-F6A3-4A84-8B33-6CE1983651EE}"/>
+              </a:ext>
+            </a:extLst>
+          </p:cNvPr>
+          <p:cNvSpPr>
+            <a:spLocks noGrp="1"/>
+          </p:cNvSpPr>
+          <p:nvPr>
+            <p:ph type="subTitle" idx="1"/>
+          </p:nvPr>
+        </p:nvSpPr>
+        <p:spPr/>
+        <p:txBody>
+          <a:bodyPr/>
+          <a:lstStyle/>
+          <a:p>
+            <a:endParaRPr lang="en-IL" dirty="0">
+              <a:solidFill>
+                <a:schemeClr val="tx1"/>
+              </a:solidFill>
+            </a:endParaRPr>
+          </a:p>
+        </p:txBody>
+      </p:sp>
+    </p:spTree>
+    <p:extLst>
+      <p:ext uri="{BB962C8B-B14F-4D97-AF65-F5344CB8AC3E}">
+        <p14:creationId xmlns:p14="http://schemas.microsoft.com/office/powerpoint/2010/main" val="912674747"/>
+      </p:ext>
+    </p:extLst>
+  </p:cSld>
+  <p:clrMapOvr>
+    <a:masterClrMapping/>
+  </p:clrMapOvr>
+  <mc:AlternateContent xmlns:mc="http://schemas.openxmlformats.org/markup-compatibility/2006" xmlns:p14="http://schemas.microsoft.com/office/powerpoint/2010/main">
+    <mc:Choice Requires="p14">
+      <p:transition spd="slow" p14:dur="2000" advClick="0"/>
+    </mc:Choice>
+    <mc:Fallback xmlns="">
+      <p:transition spd="slow" advClick="0"/>
+    </mc:Fallback>
+  </mc:AlternateContent>
+</p:sld>
+</file>
+
+<file path=ppt/slides/slide31.xml><?xml version="1.0" encoding="utf-8"?>
+<p:sld xmlns:a="http://schemas.openxmlformats.org/drawingml/2006/main" xmlns:r="http://schemas.openxmlformats.org/officeDocument/2006/relationships" xmlns:p="http://schemas.openxmlformats.org/presentationml/2006/main">
+  <p:cSld>
+    <p:spTree>
+      <p:nvGrpSpPr>
+        <p:cNvPr id="1" name=""/>
+        <p:cNvGrpSpPr/>
+        <p:nvPr/>
+      </p:nvGrpSpPr>
+      <p:grpSpPr>
+        <a:xfrm>
+          <a:off x="0" y="0"/>
+          <a:ext cx="0" cy="0"/>
+          <a:chOff x="0" y="0"/>
+          <a:chExt cx="0" cy="0"/>
+        </a:xfrm>
+      </p:grpSpPr>
+      <p:sp>
+        <p:nvSpPr>
+          <p:cNvPr id="27" name="Rectangle 26">
+            <a:extLst>
+              <a:ext uri="{FF2B5EF4-FFF2-40B4-BE49-F238E27FC236}">
+                <a16:creationId xmlns:a16="http://schemas.microsoft.com/office/drawing/2014/main" id="{64C76D42-2200-4A13-AFFB-0F543F6A81AE}"/>
+              </a:ext>
+            </a:extLst>
+          </p:cNvPr>
+          <p:cNvSpPr/>
+          <p:nvPr/>
+        </p:nvSpPr>
+        <p:spPr>
+          <a:xfrm>
+            <a:off x="5741776" y="171465"/>
+            <a:ext cx="5361617" cy="664803"/>
+          </a:xfrm>
+          <a:prstGeom prst="rect">
+            <a:avLst/>
+          </a:prstGeom>
+        </p:spPr>
+        <p:style>
+          <a:lnRef idx="1">
+            <a:schemeClr val="accent5"/>
+          </a:lnRef>
+          <a:fillRef idx="2">
+            <a:schemeClr val="accent5"/>
+          </a:fillRef>
+          <a:effectRef idx="1">
+            <a:schemeClr val="accent5"/>
+          </a:effectRef>
+          <a:fontRef idx="minor">
+            <a:schemeClr val="dk1"/>
+          </a:fontRef>
+        </p:style>
+        <p:txBody>
+          <a:bodyPr rtlCol="0" anchor="ctr"/>
+          <a:lstStyle/>
+          <a:p>
+            <a:pPr algn="ctr"/>
+            <a:endParaRPr lang="en-IL" dirty="0"/>
+          </a:p>
+        </p:txBody>
+      </p:sp>
+      <p:sp>
+        <p:nvSpPr>
+          <p:cNvPr id="2" name="Title 1">
+            <a:extLst>
+              <a:ext uri="{FF2B5EF4-FFF2-40B4-BE49-F238E27FC236}">
+                <a16:creationId xmlns:a16="http://schemas.microsoft.com/office/drawing/2014/main" id="{AD92F597-4DB6-45C7-97B2-8F408617D08A}"/>
+              </a:ext>
+            </a:extLst>
+          </p:cNvPr>
+          <p:cNvSpPr>
+            <a:spLocks noGrp="1"/>
+          </p:cNvSpPr>
+          <p:nvPr>
+            <p:ph type="title"/>
+          </p:nvPr>
+        </p:nvSpPr>
+        <p:spPr>
+          <a:xfrm>
+            <a:off x="1141412" y="0"/>
+            <a:ext cx="9905998" cy="983635"/>
+          </a:xfrm>
+        </p:spPr>
+        <p:txBody>
+          <a:bodyPr/>
+          <a:lstStyle/>
+          <a:p>
+            <a:pPr algn="r" rtl="1"/>
+            <a:r>
+              <a:rPr lang="he-IL" cap="none" dirty="0">
+                <a:solidFill>
+                  <a:schemeClr val="bg1"/>
+                </a:solidFill>
+                <a:latin typeface="Segoe UI Semibold" panose="020B0702040204020203" pitchFamily="34" charset="0"/>
+                <a:cs typeface="Segoe UI Semibold" panose="020B0702040204020203" pitchFamily="34" charset="0"/>
+              </a:rPr>
+              <a:t>אבטחת מערכת</a:t>
+            </a:r>
+            <a:endParaRPr lang="en-IL" cap="none" dirty="0">
+              <a:solidFill>
+                <a:schemeClr val="bg1"/>
+              </a:solidFill>
+              <a:latin typeface="Segoe UI Semibold" panose="020B0702040204020203" pitchFamily="34" charset="0"/>
+              <a:cs typeface="Segoe UI Semibold" panose="020B0702040204020203" pitchFamily="34" charset="0"/>
+            </a:endParaRPr>
+          </a:p>
+        </p:txBody>
+      </p:sp>
+      <p:sp>
+        <p:nvSpPr>
+          <p:cNvPr id="3" name="Content Placeholder 2">
+            <a:extLst>
+              <a:ext uri="{FF2B5EF4-FFF2-40B4-BE49-F238E27FC236}">
+                <a16:creationId xmlns:a16="http://schemas.microsoft.com/office/drawing/2014/main" id="{5DB99D37-3B94-4415-BFED-4639A5DB97A4}"/>
+              </a:ext>
+            </a:extLst>
+          </p:cNvPr>
+          <p:cNvSpPr>
+            <a:spLocks noGrp="1"/>
+          </p:cNvSpPr>
+          <p:nvPr>
+            <p:ph idx="1"/>
+          </p:nvPr>
+        </p:nvSpPr>
+        <p:spPr>
+          <a:xfrm>
+            <a:off x="659363" y="802432"/>
+            <a:ext cx="10388047" cy="5685454"/>
+          </a:xfrm>
+        </p:spPr>
+        <p:txBody>
+          <a:bodyPr>
+            <a:normAutofit/>
+          </a:bodyPr>
+          <a:lstStyle/>
+          <a:p>
+            <a:pPr algn="r" rtl="1"/>
+            <a:r>
+              <a:rPr lang="he-IL" dirty="0">
+                <a:latin typeface="Segoe UI Semilight" panose="020B0402040204020203" pitchFamily="34" charset="0"/>
+                <a:cs typeface="Segoe UI Semilight" panose="020B0402040204020203" pitchFamily="34" charset="0"/>
+              </a:rPr>
+              <a:t>ניצול מנגנונים ופרוטוקולים במערכת שלנו להזלגת מידע או שליטה במערכת.</a:t>
+            </a:r>
+          </a:p>
+          <a:p>
+            <a:pPr algn="r" rtl="1"/>
+            <a:r>
+              <a:rPr lang="he-IL" dirty="0">
+                <a:latin typeface="Segoe UI Semilight" panose="020B0402040204020203" pitchFamily="34" charset="0"/>
+                <a:cs typeface="Segoe UI Semilight" panose="020B0402040204020203" pitchFamily="34" charset="0"/>
+              </a:rPr>
+              <a:t>מתקפות </a:t>
+            </a:r>
+            <a:r>
+              <a:rPr lang="en-US" dirty="0" err="1">
+                <a:latin typeface="Segoe UI Semilight" panose="020B0402040204020203" pitchFamily="34" charset="0"/>
+                <a:cs typeface="Segoe UI Semilight" panose="020B0402040204020203" pitchFamily="34" charset="0"/>
+              </a:rPr>
+              <a:t>MiTM</a:t>
+            </a:r>
+            <a:endParaRPr lang="en-US" dirty="0">
+              <a:latin typeface="Segoe UI Semilight" panose="020B0402040204020203" pitchFamily="34" charset="0"/>
+              <a:cs typeface="Segoe UI Semilight" panose="020B0402040204020203" pitchFamily="34" charset="0"/>
+            </a:endParaRPr>
+          </a:p>
+          <a:p>
+            <a:pPr lvl="1" algn="r" rtl="1"/>
+            <a:r>
+              <a:rPr lang="en-US" dirty="0">
+                <a:latin typeface="Segoe UI Semilight" panose="020B0402040204020203" pitchFamily="34" charset="0"/>
+                <a:cs typeface="Segoe UI Semilight" panose="020B0402040204020203" pitchFamily="34" charset="0"/>
+              </a:rPr>
+              <a:t>Man In The Middle</a:t>
+            </a:r>
+            <a:endParaRPr lang="he-IL" dirty="0">
+              <a:latin typeface="Segoe UI Semilight" panose="020B0402040204020203" pitchFamily="34" charset="0"/>
+              <a:cs typeface="Segoe UI Semilight" panose="020B0402040204020203" pitchFamily="34" charset="0"/>
+            </a:endParaRPr>
+          </a:p>
+          <a:p>
+            <a:pPr lvl="1" algn="r" rtl="1"/>
+            <a:r>
+              <a:rPr lang="he-IL" dirty="0">
+                <a:latin typeface="Segoe UI Semilight" panose="020B0402040204020203" pitchFamily="34" charset="0"/>
+                <a:cs typeface="Segoe UI Semilight" panose="020B0402040204020203" pitchFamily="34" charset="0"/>
+              </a:rPr>
+              <a:t>תוקף אשר "יושב" באמצע נתיב התעבורה ושולט בכל המידע העובר בו.</a:t>
+            </a:r>
+          </a:p>
+          <a:p>
+            <a:pPr algn="r" rtl="1"/>
+            <a:r>
+              <a:rPr lang="he-IL" dirty="0">
+                <a:latin typeface="Segoe UI Semilight" panose="020B0402040204020203" pitchFamily="34" charset="0"/>
+                <a:cs typeface="Segoe UI Semilight" panose="020B0402040204020203" pitchFamily="34" charset="0"/>
+              </a:rPr>
+              <a:t>מתקפות </a:t>
+            </a:r>
+            <a:r>
+              <a:rPr lang="en-US" dirty="0">
+                <a:latin typeface="Segoe UI Semilight" panose="020B0402040204020203" pitchFamily="34" charset="0"/>
+                <a:cs typeface="Segoe UI Semilight" panose="020B0402040204020203" pitchFamily="34" charset="0"/>
+              </a:rPr>
+              <a:t>DoS</a:t>
+            </a:r>
+            <a:endParaRPr lang="he-IL" dirty="0">
+              <a:latin typeface="Segoe UI Semilight" panose="020B0402040204020203" pitchFamily="34" charset="0"/>
+              <a:cs typeface="Segoe UI Semilight" panose="020B0402040204020203" pitchFamily="34" charset="0"/>
+            </a:endParaRPr>
+          </a:p>
+          <a:p>
+            <a:pPr lvl="1" algn="r" rtl="1"/>
+            <a:r>
+              <a:rPr lang="en-US" dirty="0">
+                <a:latin typeface="Segoe UI Semilight" panose="020B0402040204020203" pitchFamily="34" charset="0"/>
+                <a:cs typeface="Segoe UI Semilight" panose="020B0402040204020203" pitchFamily="34" charset="0"/>
+              </a:rPr>
+              <a:t>Denial Of Service</a:t>
+            </a:r>
+            <a:endParaRPr lang="he-IL" dirty="0">
+              <a:latin typeface="Segoe UI Semilight" panose="020B0402040204020203" pitchFamily="34" charset="0"/>
+              <a:cs typeface="Segoe UI Semilight" panose="020B0402040204020203" pitchFamily="34" charset="0"/>
+            </a:endParaRPr>
+          </a:p>
+          <a:p>
+            <a:pPr lvl="1" algn="r" rtl="1"/>
+            <a:r>
+              <a:rPr lang="he-IL" dirty="0">
+                <a:latin typeface="Segoe UI Semilight" panose="020B0402040204020203" pitchFamily="34" charset="0"/>
+                <a:cs typeface="Segoe UI Semilight" panose="020B0402040204020203" pitchFamily="34" charset="0"/>
+              </a:rPr>
+              <a:t>מתקפות שמטרתן פגיעה במשאבי השרת כדי למנוע ממנו לספק שירות ללקוחות.</a:t>
+            </a:r>
+          </a:p>
+          <a:p>
+            <a:pPr algn="r" rtl="1"/>
+            <a:endParaRPr lang="en-US" dirty="0">
+              <a:latin typeface="Segoe UI Semilight" panose="020B0402040204020203" pitchFamily="34" charset="0"/>
+              <a:cs typeface="Segoe UI Semilight" panose="020B0402040204020203" pitchFamily="34" charset="0"/>
+            </a:endParaRPr>
+          </a:p>
+          <a:p>
+            <a:pPr algn="r" rtl="1"/>
+            <a:endParaRPr lang="he-IL" dirty="0">
+              <a:latin typeface="Segoe UI Semilight" panose="020B0402040204020203" pitchFamily="34" charset="0"/>
+              <a:cs typeface="Segoe UI Semilight" panose="020B0402040204020203" pitchFamily="34" charset="0"/>
+            </a:endParaRPr>
+          </a:p>
+          <a:p>
+            <a:pPr algn="r" rtl="1"/>
+            <a:endParaRPr lang="he-IL" dirty="0">
+              <a:latin typeface="Segoe UI Semilight" panose="020B0402040204020203" pitchFamily="34" charset="0"/>
+              <a:cs typeface="Segoe UI Semilight" panose="020B0402040204020203" pitchFamily="34" charset="0"/>
+            </a:endParaRPr>
+          </a:p>
+          <a:p>
+            <a:pPr algn="r" rtl="1"/>
+            <a:endParaRPr lang="he-IL" dirty="0">
+              <a:latin typeface="Segoe UI Semilight" panose="020B0402040204020203" pitchFamily="34" charset="0"/>
+              <a:cs typeface="Segoe UI Semilight" panose="020B0402040204020203" pitchFamily="34" charset="0"/>
+            </a:endParaRPr>
+          </a:p>
+          <a:p>
+            <a:pPr algn="r" rtl="1"/>
+            <a:endParaRPr lang="he-IL" dirty="0">
+              <a:latin typeface="Segoe UI Semilight" panose="020B0402040204020203" pitchFamily="34" charset="0"/>
+              <a:cs typeface="Segoe UI Semilight" panose="020B0402040204020203" pitchFamily="34" charset="0"/>
+            </a:endParaRPr>
+          </a:p>
+          <a:p>
+            <a:pPr lvl="1" algn="r" rtl="1"/>
+            <a:endParaRPr lang="he-IL" dirty="0">
+              <a:latin typeface="Segoe UI Semilight" panose="020B0402040204020203" pitchFamily="34" charset="0"/>
+              <a:cs typeface="Segoe UI Semilight" panose="020B0402040204020203" pitchFamily="34" charset="0"/>
+            </a:endParaRPr>
+          </a:p>
+        </p:txBody>
+      </p:sp>
+    </p:spTree>
+    <p:extLst>
+      <p:ext uri="{BB962C8B-B14F-4D97-AF65-F5344CB8AC3E}">
+        <p14:creationId xmlns:p14="http://schemas.microsoft.com/office/powerpoint/2010/main" val="4042144971"/>
+      </p:ext>
+    </p:extLst>
+  </p:cSld>
+  <p:clrMapOvr>
+    <a:masterClrMapping/>
+  </p:clrMapOvr>
+  <mc:AlternateContent xmlns:mc="http://schemas.openxmlformats.org/markup-compatibility/2006" xmlns:p14="http://schemas.microsoft.com/office/powerpoint/2010/main">
+    <mc:Choice Requires="p14">
+      <p:transition spd="slow" p14:dur="2000" advClick="0"/>
+    </mc:Choice>
+    <mc:Fallback xmlns="">
+      <p:transition spd="slow" advClick="0"/>
+    </mc:Fallback>
+  </mc:AlternateContent>
+</p:sld>
+</file>
+
+<file path=ppt/slides/slide32.xml><?xml version="1.0" encoding="utf-8"?>
+<p:sld xmlns:a="http://schemas.openxmlformats.org/drawingml/2006/main" xmlns:r="http://schemas.openxmlformats.org/officeDocument/2006/relationships" xmlns:p="http://schemas.openxmlformats.org/presentationml/2006/main">
+  <p:cSld>
+    <p:spTree>
+      <p:nvGrpSpPr>
+        <p:cNvPr id="1" name=""/>
+        <p:cNvGrpSpPr/>
+        <p:nvPr/>
+      </p:nvGrpSpPr>
+      <p:grpSpPr>
+        <a:xfrm>
+          <a:off x="0" y="0"/>
+          <a:ext cx="0" cy="0"/>
+          <a:chOff x="0" y="0"/>
+          <a:chExt cx="0" cy="0"/>
+        </a:xfrm>
+      </p:grpSpPr>
+      <p:sp>
+        <p:nvSpPr>
+          <p:cNvPr id="27" name="Rectangle 26">
+            <a:extLst>
+              <a:ext uri="{FF2B5EF4-FFF2-40B4-BE49-F238E27FC236}">
+                <a16:creationId xmlns:a16="http://schemas.microsoft.com/office/drawing/2014/main" id="{64C76D42-2200-4A13-AFFB-0F543F6A81AE}"/>
+              </a:ext>
+            </a:extLst>
+          </p:cNvPr>
+          <p:cNvSpPr/>
+          <p:nvPr/>
+        </p:nvSpPr>
+        <p:spPr>
+          <a:xfrm>
+            <a:off x="5741776" y="171465"/>
+            <a:ext cx="5361617" cy="664803"/>
+          </a:xfrm>
+          <a:prstGeom prst="rect">
+            <a:avLst/>
+          </a:prstGeom>
+        </p:spPr>
+        <p:style>
+          <a:lnRef idx="1">
+            <a:schemeClr val="accent5"/>
+          </a:lnRef>
+          <a:fillRef idx="2">
+            <a:schemeClr val="accent5"/>
+          </a:fillRef>
+          <a:effectRef idx="1">
+            <a:schemeClr val="accent5"/>
+          </a:effectRef>
+          <a:fontRef idx="minor">
+            <a:schemeClr val="dk1"/>
+          </a:fontRef>
+        </p:style>
+        <p:txBody>
+          <a:bodyPr rtlCol="0" anchor="ctr"/>
+          <a:lstStyle/>
+          <a:p>
+            <a:pPr algn="ctr"/>
+            <a:endParaRPr lang="en-IL" dirty="0"/>
+          </a:p>
+        </p:txBody>
+      </p:sp>
+      <p:sp>
+        <p:nvSpPr>
+          <p:cNvPr id="2" name="Title 1">
+            <a:extLst>
+              <a:ext uri="{FF2B5EF4-FFF2-40B4-BE49-F238E27FC236}">
+                <a16:creationId xmlns:a16="http://schemas.microsoft.com/office/drawing/2014/main" id="{AD92F597-4DB6-45C7-97B2-8F408617D08A}"/>
+              </a:ext>
+            </a:extLst>
+          </p:cNvPr>
+          <p:cNvSpPr>
+            <a:spLocks noGrp="1"/>
+          </p:cNvSpPr>
+          <p:nvPr>
+            <p:ph type="title"/>
+          </p:nvPr>
+        </p:nvSpPr>
+        <p:spPr>
+          <a:xfrm>
+            <a:off x="1141412" y="0"/>
+            <a:ext cx="9905998" cy="983635"/>
+          </a:xfrm>
+        </p:spPr>
+        <p:txBody>
+          <a:bodyPr/>
+          <a:lstStyle/>
+          <a:p>
+            <a:pPr algn="r" rtl="1"/>
+            <a:r>
+              <a:rPr lang="he-IL" cap="none" dirty="0">
+                <a:solidFill>
+                  <a:schemeClr val="bg1"/>
+                </a:solidFill>
+                <a:latin typeface="Segoe UI Semibold" panose="020B0702040204020203" pitchFamily="34" charset="0"/>
+                <a:cs typeface="Segoe UI Semibold" panose="020B0702040204020203" pitchFamily="34" charset="0"/>
+              </a:rPr>
+              <a:t>מתקפות </a:t>
+            </a:r>
+            <a:r>
+              <a:rPr lang="en-US" cap="none" dirty="0" err="1">
+                <a:solidFill>
+                  <a:schemeClr val="bg1"/>
+                </a:solidFill>
+                <a:latin typeface="Segoe UI Semibold" panose="020B0702040204020203" pitchFamily="34" charset="0"/>
+                <a:cs typeface="Segoe UI Semibold" panose="020B0702040204020203" pitchFamily="34" charset="0"/>
+              </a:rPr>
+              <a:t>MiTM</a:t>
+            </a:r>
+            <a:endParaRPr lang="en-IL" cap="none" dirty="0">
+              <a:solidFill>
+                <a:schemeClr val="bg1"/>
+              </a:solidFill>
+              <a:latin typeface="Segoe UI Semibold" panose="020B0702040204020203" pitchFamily="34" charset="0"/>
+              <a:cs typeface="Segoe UI Semibold" panose="020B0702040204020203" pitchFamily="34" charset="0"/>
+            </a:endParaRPr>
+          </a:p>
+        </p:txBody>
+      </p:sp>
+      <p:sp>
+        <p:nvSpPr>
+          <p:cNvPr id="3" name="Content Placeholder 2">
+            <a:extLst>
+              <a:ext uri="{FF2B5EF4-FFF2-40B4-BE49-F238E27FC236}">
+                <a16:creationId xmlns:a16="http://schemas.microsoft.com/office/drawing/2014/main" id="{5DB99D37-3B94-4415-BFED-4639A5DB97A4}"/>
+              </a:ext>
+            </a:extLst>
+          </p:cNvPr>
+          <p:cNvSpPr>
+            <a:spLocks noGrp="1"/>
+          </p:cNvSpPr>
+          <p:nvPr>
+            <p:ph idx="1"/>
+          </p:nvPr>
+        </p:nvSpPr>
+        <p:spPr>
+          <a:xfrm>
+            <a:off x="4099249" y="802432"/>
+            <a:ext cx="6948161" cy="5685454"/>
+          </a:xfrm>
+        </p:spPr>
+        <p:txBody>
+          <a:bodyPr>
+            <a:normAutofit/>
+          </a:bodyPr>
+          <a:lstStyle/>
+          <a:p>
+            <a:pPr algn="r" rtl="1"/>
+            <a:r>
+              <a:rPr lang="en-US" dirty="0">
+                <a:latin typeface="Segoe UI Semilight" panose="020B0402040204020203" pitchFamily="34" charset="0"/>
+                <a:cs typeface="Segoe UI Semilight" panose="020B0402040204020203" pitchFamily="34" charset="0"/>
+              </a:rPr>
+              <a:t>ARP Poisoning</a:t>
+            </a:r>
+          </a:p>
+          <a:p>
+            <a:pPr lvl="1" algn="r" rtl="1"/>
+            <a:r>
+              <a:rPr lang="en-US" dirty="0">
+                <a:latin typeface="Segoe UI Semilight" panose="020B0402040204020203" pitchFamily="34" charset="0"/>
+                <a:cs typeface="Segoe UI Semilight" panose="020B0402040204020203" pitchFamily="34" charset="0"/>
+              </a:rPr>
+              <a:t>ARP</a:t>
+            </a:r>
+            <a:r>
+              <a:rPr lang="he-IL" dirty="0">
+                <a:latin typeface="Segoe UI Semilight" panose="020B0402040204020203" pitchFamily="34" charset="0"/>
+                <a:cs typeface="Segoe UI Semilight" panose="020B0402040204020203" pitchFamily="34" charset="0"/>
+              </a:rPr>
+              <a:t> – פרוטוקול שמטרתו להמיר כתובת </a:t>
+            </a:r>
+            <a:r>
+              <a:rPr lang="en-US" dirty="0">
+                <a:latin typeface="Segoe UI Semilight" panose="020B0402040204020203" pitchFamily="34" charset="0"/>
+                <a:cs typeface="Segoe UI Semilight" panose="020B0402040204020203" pitchFamily="34" charset="0"/>
+              </a:rPr>
+              <a:t>IP</a:t>
+            </a:r>
+            <a:r>
+              <a:rPr lang="he-IL" dirty="0">
+                <a:latin typeface="Segoe UI Semilight" panose="020B0402040204020203" pitchFamily="34" charset="0"/>
+                <a:cs typeface="Segoe UI Semilight" panose="020B0402040204020203" pitchFamily="34" charset="0"/>
+              </a:rPr>
+              <a:t> לכתובת </a:t>
+            </a:r>
+            <a:r>
+              <a:rPr lang="en-US" dirty="0">
+                <a:latin typeface="Segoe UI Semilight" panose="020B0402040204020203" pitchFamily="34" charset="0"/>
+                <a:cs typeface="Segoe UI Semilight" panose="020B0402040204020203" pitchFamily="34" charset="0"/>
+              </a:rPr>
+              <a:t>MAC</a:t>
+            </a:r>
+            <a:endParaRPr lang="he-IL" dirty="0">
+              <a:latin typeface="Segoe UI Semilight" panose="020B0402040204020203" pitchFamily="34" charset="0"/>
+              <a:cs typeface="Segoe UI Semilight" panose="020B0402040204020203" pitchFamily="34" charset="0"/>
+            </a:endParaRPr>
+          </a:p>
+          <a:p>
+            <a:pPr lvl="1" algn="r" rtl="1"/>
+            <a:r>
+              <a:rPr lang="he-IL" dirty="0">
+                <a:latin typeface="Segoe UI Semilight" panose="020B0402040204020203" pitchFamily="34" charset="0"/>
+                <a:cs typeface="Segoe UI Semilight" panose="020B0402040204020203" pitchFamily="34" charset="0"/>
+              </a:rPr>
+              <a:t>התוקף מרעיל את טבלת ה-</a:t>
+            </a:r>
+            <a:r>
+              <a:rPr lang="en-US" dirty="0">
+                <a:latin typeface="Segoe UI Semilight" panose="020B0402040204020203" pitchFamily="34" charset="0"/>
+                <a:cs typeface="Segoe UI Semilight" panose="020B0402040204020203" pitchFamily="34" charset="0"/>
+              </a:rPr>
+              <a:t>ARP</a:t>
+            </a:r>
+            <a:r>
+              <a:rPr lang="he-IL" dirty="0">
+                <a:latin typeface="Segoe UI Semilight" panose="020B0402040204020203" pitchFamily="34" charset="0"/>
+                <a:cs typeface="Segoe UI Semilight" panose="020B0402040204020203" pitchFamily="34" charset="0"/>
+              </a:rPr>
+              <a:t> כדי שכתובת ה-</a:t>
+            </a:r>
+            <a:r>
+              <a:rPr lang="en-US" dirty="0">
+                <a:latin typeface="Segoe UI Semilight" panose="020B0402040204020203" pitchFamily="34" charset="0"/>
+                <a:cs typeface="Segoe UI Semilight" panose="020B0402040204020203" pitchFamily="34" charset="0"/>
+              </a:rPr>
+              <a:t>IP</a:t>
+            </a:r>
+            <a:r>
+              <a:rPr lang="he-IL" dirty="0">
+                <a:latin typeface="Segoe UI Semilight" panose="020B0402040204020203" pitchFamily="34" charset="0"/>
+                <a:cs typeface="Segoe UI Semilight" panose="020B0402040204020203" pitchFamily="34" charset="0"/>
+              </a:rPr>
+              <a:t> של היעד תפנה לכתובת ה-</a:t>
+            </a:r>
+            <a:r>
+              <a:rPr lang="en-US" dirty="0">
+                <a:latin typeface="Segoe UI Semilight" panose="020B0402040204020203" pitchFamily="34" charset="0"/>
+                <a:cs typeface="Segoe UI Semilight" panose="020B0402040204020203" pitchFamily="34" charset="0"/>
+              </a:rPr>
+              <a:t>MAC</a:t>
+            </a:r>
+            <a:r>
+              <a:rPr lang="he-IL" dirty="0">
+                <a:latin typeface="Segoe UI Semilight" panose="020B0402040204020203" pitchFamily="34" charset="0"/>
+                <a:cs typeface="Segoe UI Semilight" panose="020B0402040204020203" pitchFamily="34" charset="0"/>
+              </a:rPr>
+              <a:t> שלו.</a:t>
+            </a:r>
+          </a:p>
+          <a:p>
+            <a:pPr lvl="1" algn="r" rtl="1"/>
+            <a:r>
+              <a:rPr lang="he-IL" dirty="0">
+                <a:latin typeface="Segoe UI Semilight" panose="020B0402040204020203" pitchFamily="34" charset="0"/>
+                <a:cs typeface="Segoe UI Semilight" panose="020B0402040204020203" pitchFamily="34" charset="0"/>
+              </a:rPr>
+              <a:t>ההודעות נשלחות לתוקף, והוא מעביר אותן ליעד המקורי.</a:t>
+            </a:r>
+          </a:p>
+          <a:p>
+            <a:pPr lvl="1" algn="r" rtl="1"/>
+            <a:endParaRPr lang="he-IL" dirty="0">
+              <a:latin typeface="Segoe UI Semilight" panose="020B0402040204020203" pitchFamily="34" charset="0"/>
+              <a:cs typeface="Segoe UI Semilight" panose="020B0402040204020203" pitchFamily="34" charset="0"/>
+            </a:endParaRPr>
+          </a:p>
+          <a:p>
+            <a:pPr algn="r" rtl="1"/>
+            <a:r>
+              <a:rPr lang="en-US" dirty="0">
+                <a:latin typeface="Segoe UI Semilight" panose="020B0402040204020203" pitchFamily="34" charset="0"/>
+                <a:cs typeface="Segoe UI Semilight" panose="020B0402040204020203" pitchFamily="34" charset="0"/>
+              </a:rPr>
+              <a:t>DNS Poisoning</a:t>
+            </a:r>
+            <a:endParaRPr lang="he-IL" dirty="0">
+              <a:latin typeface="Segoe UI Semilight" panose="020B0402040204020203" pitchFamily="34" charset="0"/>
+              <a:cs typeface="Segoe UI Semilight" panose="020B0402040204020203" pitchFamily="34" charset="0"/>
+            </a:endParaRPr>
+          </a:p>
+          <a:p>
+            <a:pPr lvl="1" algn="r" rtl="1"/>
+            <a:r>
+              <a:rPr lang="en-US" dirty="0">
+                <a:latin typeface="Segoe UI Semilight" panose="020B0402040204020203" pitchFamily="34" charset="0"/>
+                <a:cs typeface="Segoe UI Semilight" panose="020B0402040204020203" pitchFamily="34" charset="0"/>
+              </a:rPr>
+              <a:t>DNS</a:t>
+            </a:r>
+            <a:r>
+              <a:rPr lang="he-IL" dirty="0">
+                <a:latin typeface="Segoe UI Semilight" panose="020B0402040204020203" pitchFamily="34" charset="0"/>
+                <a:cs typeface="Segoe UI Semilight" panose="020B0402040204020203" pitchFamily="34" charset="0"/>
+              </a:rPr>
+              <a:t> – פרוטוקול שמטרתו להמיר </a:t>
+            </a:r>
+            <a:r>
+              <a:rPr lang="en-US" dirty="0">
+                <a:latin typeface="Segoe UI Semilight" panose="020B0402040204020203" pitchFamily="34" charset="0"/>
+                <a:cs typeface="Segoe UI Semilight" panose="020B0402040204020203" pitchFamily="34" charset="0"/>
+              </a:rPr>
+              <a:t>domain</a:t>
+            </a:r>
+            <a:r>
+              <a:rPr lang="he-IL" dirty="0">
+                <a:latin typeface="Segoe UI Semilight" panose="020B0402040204020203" pitchFamily="34" charset="0"/>
+                <a:cs typeface="Segoe UI Semilight" panose="020B0402040204020203" pitchFamily="34" charset="0"/>
+              </a:rPr>
+              <a:t> לכתובת </a:t>
+            </a:r>
+            <a:r>
+              <a:rPr lang="en-US" dirty="0">
+                <a:latin typeface="Segoe UI Semilight" panose="020B0402040204020203" pitchFamily="34" charset="0"/>
+                <a:cs typeface="Segoe UI Semilight" panose="020B0402040204020203" pitchFamily="34" charset="0"/>
+              </a:rPr>
+              <a:t>IP</a:t>
+            </a:r>
+            <a:r>
+              <a:rPr lang="he-IL" dirty="0">
+                <a:latin typeface="Segoe UI Semilight" panose="020B0402040204020203" pitchFamily="34" charset="0"/>
+                <a:cs typeface="Segoe UI Semilight" panose="020B0402040204020203" pitchFamily="34" charset="0"/>
+              </a:rPr>
+              <a:t>.</a:t>
+            </a:r>
+          </a:p>
+          <a:p>
+            <a:pPr lvl="1" algn="r" rtl="1"/>
+            <a:r>
+              <a:rPr lang="he-IL" dirty="0">
+                <a:latin typeface="Segoe UI Semilight" panose="020B0402040204020203" pitchFamily="34" charset="0"/>
+                <a:cs typeface="Segoe UI Semilight" panose="020B0402040204020203" pitchFamily="34" charset="0"/>
+              </a:rPr>
+              <a:t>התוקף מזייף הודעה שנשלחה משרת </a:t>
+            </a:r>
+            <a:r>
+              <a:rPr lang="en-US" dirty="0">
+                <a:latin typeface="Segoe UI Semilight" panose="020B0402040204020203" pitchFamily="34" charset="0"/>
+                <a:cs typeface="Segoe UI Semilight" panose="020B0402040204020203" pitchFamily="34" charset="0"/>
+              </a:rPr>
+              <a:t>DNS</a:t>
+            </a:r>
+            <a:r>
+              <a:rPr lang="he-IL" dirty="0">
+                <a:latin typeface="Segoe UI Semilight" panose="020B0402040204020203" pitchFamily="34" charset="0"/>
+                <a:cs typeface="Segoe UI Semilight" panose="020B0402040204020203" pitchFamily="34" charset="0"/>
+              </a:rPr>
+              <a:t> ובכך מרעיל את טבלת ה-</a:t>
+            </a:r>
+            <a:r>
+              <a:rPr lang="en-US" dirty="0">
+                <a:latin typeface="Segoe UI Semilight" panose="020B0402040204020203" pitchFamily="34" charset="0"/>
+                <a:cs typeface="Segoe UI Semilight" panose="020B0402040204020203" pitchFamily="34" charset="0"/>
+              </a:rPr>
+              <a:t>DNS</a:t>
+            </a:r>
+            <a:r>
+              <a:rPr lang="he-IL" dirty="0">
+                <a:latin typeface="Segoe UI Semilight" panose="020B0402040204020203" pitchFamily="34" charset="0"/>
+                <a:cs typeface="Segoe UI Semilight" panose="020B0402040204020203" pitchFamily="34" charset="0"/>
+              </a:rPr>
+              <a:t> השמורה במחשב הלקוח.</a:t>
+            </a:r>
+          </a:p>
+          <a:p>
+            <a:pPr lvl="1" algn="r" rtl="1"/>
+            <a:r>
+              <a:rPr lang="he-IL" dirty="0">
+                <a:latin typeface="Segoe UI Semilight" panose="020B0402040204020203" pitchFamily="34" charset="0"/>
+                <a:cs typeface="Segoe UI Semilight" panose="020B0402040204020203" pitchFamily="34" charset="0"/>
+              </a:rPr>
+              <a:t>הודעות הלקוח נשלחות לכתובת ה-</a:t>
+            </a:r>
+            <a:r>
+              <a:rPr lang="en-US" dirty="0">
+                <a:latin typeface="Segoe UI Semilight" panose="020B0402040204020203" pitchFamily="34" charset="0"/>
+                <a:cs typeface="Segoe UI Semilight" panose="020B0402040204020203" pitchFamily="34" charset="0"/>
+              </a:rPr>
+              <a:t>IP</a:t>
+            </a:r>
+            <a:r>
+              <a:rPr lang="he-IL" dirty="0">
+                <a:latin typeface="Segoe UI Semilight" panose="020B0402040204020203" pitchFamily="34" charset="0"/>
+                <a:cs typeface="Segoe UI Semilight" panose="020B0402040204020203" pitchFamily="34" charset="0"/>
+              </a:rPr>
+              <a:t> של התוקף והוא ממסר את ההודעות בין הלקוח לשרת.</a:t>
+            </a:r>
+            <a:endParaRPr lang="en-US" dirty="0">
+              <a:latin typeface="Segoe UI Semilight" panose="020B0402040204020203" pitchFamily="34" charset="0"/>
+              <a:cs typeface="Segoe UI Semilight" panose="020B0402040204020203" pitchFamily="34" charset="0"/>
+            </a:endParaRPr>
+          </a:p>
+          <a:p>
+            <a:pPr algn="r" rtl="1"/>
+            <a:endParaRPr lang="he-IL" dirty="0">
+              <a:latin typeface="Segoe UI Semilight" panose="020B0402040204020203" pitchFamily="34" charset="0"/>
+              <a:cs typeface="Segoe UI Semilight" panose="020B0402040204020203" pitchFamily="34" charset="0"/>
+            </a:endParaRPr>
+          </a:p>
+          <a:p>
+            <a:pPr algn="r" rtl="1"/>
+            <a:endParaRPr lang="he-IL" dirty="0">
+              <a:latin typeface="Segoe UI Semilight" panose="020B0402040204020203" pitchFamily="34" charset="0"/>
+              <a:cs typeface="Segoe UI Semilight" panose="020B0402040204020203" pitchFamily="34" charset="0"/>
+            </a:endParaRPr>
+          </a:p>
+          <a:p>
+            <a:pPr algn="r" rtl="1"/>
+            <a:endParaRPr lang="he-IL" dirty="0">
+              <a:latin typeface="Segoe UI Semilight" panose="020B0402040204020203" pitchFamily="34" charset="0"/>
+              <a:cs typeface="Segoe UI Semilight" panose="020B0402040204020203" pitchFamily="34" charset="0"/>
+            </a:endParaRPr>
+          </a:p>
+          <a:p>
+            <a:pPr algn="r" rtl="1"/>
+            <a:endParaRPr lang="he-IL" dirty="0">
+              <a:latin typeface="Segoe UI Semilight" panose="020B0402040204020203" pitchFamily="34" charset="0"/>
+              <a:cs typeface="Segoe UI Semilight" panose="020B0402040204020203" pitchFamily="34" charset="0"/>
+            </a:endParaRPr>
+          </a:p>
+          <a:p>
+            <a:pPr lvl="1" algn="r" rtl="1"/>
+            <a:endParaRPr lang="he-IL" dirty="0">
+              <a:latin typeface="Segoe UI Semilight" panose="020B0402040204020203" pitchFamily="34" charset="0"/>
+              <a:cs typeface="Segoe UI Semilight" panose="020B0402040204020203" pitchFamily="34" charset="0"/>
+            </a:endParaRPr>
+          </a:p>
+        </p:txBody>
+      </p:sp>
+      <p:pic>
+        <p:nvPicPr>
+          <p:cNvPr id="5" name="Picture 4">
+            <a:extLst>
+              <a:ext uri="{FF2B5EF4-FFF2-40B4-BE49-F238E27FC236}">
+                <a16:creationId xmlns:a16="http://schemas.microsoft.com/office/drawing/2014/main" id="{7092AA0C-B519-4BC7-8266-3ECCE84B660E}"/>
+              </a:ext>
+            </a:extLst>
+          </p:cNvPr>
+          <p:cNvPicPr>
+            <a:picLocks noChangeAspect="1"/>
+          </p:cNvPicPr>
+          <p:nvPr/>
+        </p:nvPicPr>
+        <p:blipFill>
+          <a:blip r:embed="rId3"/>
+          <a:stretch>
+            <a:fillRect/>
+          </a:stretch>
+        </p:blipFill>
+        <p:spPr>
+          <a:xfrm>
+            <a:off x="684996" y="171465"/>
+            <a:ext cx="3134930" cy="1873153"/>
+          </a:xfrm>
+          <a:prstGeom prst="rect">
+            <a:avLst/>
+          </a:prstGeom>
+        </p:spPr>
+      </p:pic>
+      <p:pic>
+        <p:nvPicPr>
+          <p:cNvPr id="7" name="Picture 6">
+            <a:extLst>
+              <a:ext uri="{FF2B5EF4-FFF2-40B4-BE49-F238E27FC236}">
+                <a16:creationId xmlns:a16="http://schemas.microsoft.com/office/drawing/2014/main" id="{AF092C45-994D-45E1-8E67-1426A214E215}"/>
+              </a:ext>
+            </a:extLst>
+          </p:cNvPr>
+          <p:cNvPicPr>
+            <a:picLocks noChangeAspect="1"/>
+          </p:cNvPicPr>
+          <p:nvPr/>
+        </p:nvPicPr>
+        <p:blipFill>
+          <a:blip r:embed="rId4"/>
+          <a:stretch>
+            <a:fillRect/>
+          </a:stretch>
+        </p:blipFill>
+        <p:spPr>
+          <a:xfrm>
+            <a:off x="759174" y="2357934"/>
+            <a:ext cx="2986573" cy="1377826"/>
+          </a:xfrm>
+          <a:prstGeom prst="rect">
+            <a:avLst/>
+          </a:prstGeom>
+        </p:spPr>
+      </p:pic>
+      <p:pic>
+        <p:nvPicPr>
+          <p:cNvPr id="9" name="Picture 8">
+            <a:extLst>
+              <a:ext uri="{FF2B5EF4-FFF2-40B4-BE49-F238E27FC236}">
+                <a16:creationId xmlns:a16="http://schemas.microsoft.com/office/drawing/2014/main" id="{369F9FA6-A5C3-42BC-8C1F-2138E2DCAE2F}"/>
+              </a:ext>
+            </a:extLst>
+          </p:cNvPr>
+          <p:cNvPicPr>
+            <a:picLocks noChangeAspect="1"/>
+          </p:cNvPicPr>
+          <p:nvPr/>
+        </p:nvPicPr>
+        <p:blipFill>
+          <a:blip r:embed="rId5"/>
+          <a:stretch>
+            <a:fillRect/>
+          </a:stretch>
+        </p:blipFill>
+        <p:spPr>
+          <a:xfrm>
+            <a:off x="854187" y="3881534"/>
+            <a:ext cx="2796545" cy="2728718"/>
+          </a:xfrm>
+          <a:prstGeom prst="rect">
+            <a:avLst/>
+          </a:prstGeom>
+        </p:spPr>
+      </p:pic>
+    </p:spTree>
+    <p:extLst>
+      <p:ext uri="{BB962C8B-B14F-4D97-AF65-F5344CB8AC3E}">
+        <p14:creationId xmlns:p14="http://schemas.microsoft.com/office/powerpoint/2010/main" val="3429118358"/>
+      </p:ext>
+    </p:extLst>
+  </p:cSld>
+  <p:clrMapOvr>
+    <a:masterClrMapping/>
+  </p:clrMapOvr>
+  <mc:AlternateContent xmlns:mc="http://schemas.openxmlformats.org/markup-compatibility/2006" xmlns:p14="http://schemas.microsoft.com/office/powerpoint/2010/main">
+    <mc:Choice Requires="p14">
+      <p:transition spd="slow" p14:dur="2000" advClick="0"/>
+    </mc:Choice>
+    <mc:Fallback xmlns="">
+      <p:transition spd="slow" advClick="0"/>
+    </mc:Fallback>
+  </mc:AlternateContent>
+</p:sld>
+</file>
+
+<file path=ppt/slides/slide33.xml><?xml version="1.0" encoding="utf-8"?>
+<p:sld xmlns:a="http://schemas.openxmlformats.org/drawingml/2006/main" xmlns:r="http://schemas.openxmlformats.org/officeDocument/2006/relationships" xmlns:p="http://schemas.openxmlformats.org/presentationml/2006/main">
+  <p:cSld>
+    <p:spTree>
+      <p:nvGrpSpPr>
+        <p:cNvPr id="1" name=""/>
+        <p:cNvGrpSpPr/>
+        <p:nvPr/>
+      </p:nvGrpSpPr>
+      <p:grpSpPr>
+        <a:xfrm>
+          <a:off x="0" y="0"/>
+          <a:ext cx="0" cy="0"/>
+          <a:chOff x="0" y="0"/>
+          <a:chExt cx="0" cy="0"/>
+        </a:xfrm>
+      </p:grpSpPr>
+      <p:sp>
+        <p:nvSpPr>
+          <p:cNvPr id="27" name="Rectangle 26">
+            <a:extLst>
+              <a:ext uri="{FF2B5EF4-FFF2-40B4-BE49-F238E27FC236}">
+                <a16:creationId xmlns:a16="http://schemas.microsoft.com/office/drawing/2014/main" id="{64C76D42-2200-4A13-AFFB-0F543F6A81AE}"/>
+              </a:ext>
+            </a:extLst>
+          </p:cNvPr>
+          <p:cNvSpPr/>
+          <p:nvPr/>
+        </p:nvSpPr>
+        <p:spPr>
+          <a:xfrm>
+            <a:off x="5741776" y="171465"/>
+            <a:ext cx="5361617" cy="664803"/>
+          </a:xfrm>
+          <a:prstGeom prst="rect">
+            <a:avLst/>
+          </a:prstGeom>
+        </p:spPr>
+        <p:style>
+          <a:lnRef idx="1">
+            <a:schemeClr val="accent5"/>
+          </a:lnRef>
+          <a:fillRef idx="2">
+            <a:schemeClr val="accent5"/>
+          </a:fillRef>
+          <a:effectRef idx="1">
+            <a:schemeClr val="accent5"/>
+          </a:effectRef>
+          <a:fontRef idx="minor">
+            <a:schemeClr val="dk1"/>
+          </a:fontRef>
+        </p:style>
+        <p:txBody>
+          <a:bodyPr rtlCol="0" anchor="ctr"/>
+          <a:lstStyle/>
+          <a:p>
+            <a:pPr algn="ctr"/>
+            <a:endParaRPr lang="en-IL" dirty="0"/>
+          </a:p>
+        </p:txBody>
+      </p:sp>
+      <p:sp>
+        <p:nvSpPr>
+          <p:cNvPr id="2" name="Title 1">
+            <a:extLst>
+              <a:ext uri="{FF2B5EF4-FFF2-40B4-BE49-F238E27FC236}">
+                <a16:creationId xmlns:a16="http://schemas.microsoft.com/office/drawing/2014/main" id="{AD92F597-4DB6-45C7-97B2-8F408617D08A}"/>
+              </a:ext>
+            </a:extLst>
+          </p:cNvPr>
+          <p:cNvSpPr>
+            <a:spLocks noGrp="1"/>
+          </p:cNvSpPr>
+          <p:nvPr>
+            <p:ph type="title"/>
+          </p:nvPr>
+        </p:nvSpPr>
+        <p:spPr>
+          <a:xfrm>
+            <a:off x="1141412" y="0"/>
+            <a:ext cx="9905998" cy="983635"/>
+          </a:xfrm>
+        </p:spPr>
+        <p:txBody>
+          <a:bodyPr/>
+          <a:lstStyle/>
+          <a:p>
+            <a:pPr algn="r" rtl="1"/>
+            <a:r>
+              <a:rPr lang="he-IL" cap="none" dirty="0">
+                <a:solidFill>
+                  <a:schemeClr val="bg1"/>
+                </a:solidFill>
+                <a:latin typeface="Segoe UI Semibold" panose="020B0702040204020203" pitchFamily="34" charset="0"/>
+                <a:cs typeface="Segoe UI Semibold" panose="020B0702040204020203" pitchFamily="34" charset="0"/>
+              </a:rPr>
+              <a:t>מתקפות </a:t>
+            </a:r>
+            <a:r>
+              <a:rPr lang="en-US" cap="none" dirty="0">
+                <a:solidFill>
+                  <a:schemeClr val="bg1"/>
+                </a:solidFill>
+                <a:latin typeface="Segoe UI Semibold" panose="020B0702040204020203" pitchFamily="34" charset="0"/>
+                <a:cs typeface="Segoe UI Semibold" panose="020B0702040204020203" pitchFamily="34" charset="0"/>
+              </a:rPr>
+              <a:t>DoS</a:t>
+            </a:r>
+            <a:endParaRPr lang="en-IL" cap="none" dirty="0">
+              <a:solidFill>
+                <a:schemeClr val="bg1"/>
+              </a:solidFill>
+              <a:latin typeface="Segoe UI Semibold" panose="020B0702040204020203" pitchFamily="34" charset="0"/>
+              <a:cs typeface="Segoe UI Semibold" panose="020B0702040204020203" pitchFamily="34" charset="0"/>
+            </a:endParaRPr>
+          </a:p>
+        </p:txBody>
+      </p:sp>
+      <p:sp>
+        <p:nvSpPr>
+          <p:cNvPr id="3" name="Content Placeholder 2">
+            <a:extLst>
+              <a:ext uri="{FF2B5EF4-FFF2-40B4-BE49-F238E27FC236}">
+                <a16:creationId xmlns:a16="http://schemas.microsoft.com/office/drawing/2014/main" id="{5DB99D37-3B94-4415-BFED-4639A5DB97A4}"/>
+              </a:ext>
+            </a:extLst>
+          </p:cNvPr>
+          <p:cNvSpPr>
+            <a:spLocks noGrp="1"/>
+          </p:cNvSpPr>
+          <p:nvPr>
+            <p:ph idx="1"/>
+          </p:nvPr>
+        </p:nvSpPr>
+        <p:spPr>
+          <a:xfrm>
+            <a:off x="4217437" y="802432"/>
+            <a:ext cx="6829973" cy="5822304"/>
+          </a:xfrm>
+        </p:spPr>
+        <p:txBody>
+          <a:bodyPr>
+            <a:normAutofit/>
+          </a:bodyPr>
+          <a:lstStyle/>
+          <a:p>
+            <a:pPr algn="r" rtl="1"/>
+            <a:r>
+              <a:rPr lang="en-US" dirty="0">
+                <a:latin typeface="Segoe UI Semilight" panose="020B0402040204020203" pitchFamily="34" charset="0"/>
+                <a:cs typeface="Segoe UI Semilight" panose="020B0402040204020203" pitchFamily="34" charset="0"/>
+              </a:rPr>
+              <a:t>Dos</a:t>
+            </a:r>
+            <a:endParaRPr lang="he-IL" dirty="0">
+              <a:latin typeface="Segoe UI Semilight" panose="020B0402040204020203" pitchFamily="34" charset="0"/>
+              <a:cs typeface="Segoe UI Semilight" panose="020B0402040204020203" pitchFamily="34" charset="0"/>
+            </a:endParaRPr>
+          </a:p>
+          <a:p>
+            <a:pPr lvl="1" algn="r" rtl="1"/>
+            <a:r>
+              <a:rPr lang="he-IL" dirty="0">
+                <a:latin typeface="Segoe UI Semilight" panose="020B0402040204020203" pitchFamily="34" charset="0"/>
+                <a:cs typeface="Segoe UI Semilight" panose="020B0402040204020203" pitchFamily="34" charset="0"/>
+              </a:rPr>
+              <a:t>תוקף שולח מספר רב של בקשות לשרת על מנת להעמיס עליו ובכך השרת לא יהיה נגיש לבקשות של שאר הלקוחות הלגיטימיים.</a:t>
+            </a:r>
+          </a:p>
+          <a:p>
+            <a:pPr algn="r" rtl="1"/>
+            <a:r>
+              <a:rPr lang="en-US" dirty="0">
+                <a:latin typeface="Segoe UI Semilight" panose="020B0402040204020203" pitchFamily="34" charset="0"/>
+                <a:cs typeface="Segoe UI Semilight" panose="020B0402040204020203" pitchFamily="34" charset="0"/>
+              </a:rPr>
+              <a:t>DDoS</a:t>
+            </a:r>
+            <a:endParaRPr lang="he-IL" dirty="0">
+              <a:latin typeface="Segoe UI Semilight" panose="020B0402040204020203" pitchFamily="34" charset="0"/>
+              <a:cs typeface="Segoe UI Semilight" panose="020B0402040204020203" pitchFamily="34" charset="0"/>
+            </a:endParaRPr>
+          </a:p>
+          <a:p>
+            <a:pPr lvl="1" algn="r" rtl="1"/>
+            <a:r>
+              <a:rPr lang="en-US" dirty="0">
+                <a:latin typeface="Segoe UI Semilight" panose="020B0402040204020203" pitchFamily="34" charset="0"/>
+                <a:cs typeface="Segoe UI Semilight" panose="020B0402040204020203" pitchFamily="34" charset="0"/>
+              </a:rPr>
+              <a:t>Distributed Denial Of Service</a:t>
+            </a:r>
+            <a:endParaRPr lang="he-IL" dirty="0">
+              <a:latin typeface="Segoe UI Semilight" panose="020B0402040204020203" pitchFamily="34" charset="0"/>
+              <a:cs typeface="Segoe UI Semilight" panose="020B0402040204020203" pitchFamily="34" charset="0"/>
+            </a:endParaRPr>
+          </a:p>
+          <a:p>
+            <a:pPr lvl="1" algn="r" rtl="1"/>
+            <a:r>
+              <a:rPr lang="he-IL" dirty="0">
+                <a:latin typeface="Segoe UI Semilight" panose="020B0402040204020203" pitchFamily="34" charset="0"/>
+                <a:cs typeface="Segoe UI Semilight" panose="020B0402040204020203" pitchFamily="34" charset="0"/>
+              </a:rPr>
+              <a:t>ביצעו מתקפת </a:t>
+            </a:r>
+            <a:r>
+              <a:rPr lang="en-US" dirty="0">
+                <a:latin typeface="Segoe UI Semilight" panose="020B0402040204020203" pitchFamily="34" charset="0"/>
+                <a:cs typeface="Segoe UI Semilight" panose="020B0402040204020203" pitchFamily="34" charset="0"/>
+              </a:rPr>
+              <a:t>DoS</a:t>
+            </a:r>
+            <a:r>
+              <a:rPr lang="he-IL" dirty="0">
+                <a:latin typeface="Segoe UI Semilight" panose="020B0402040204020203" pitchFamily="34" charset="0"/>
+                <a:cs typeface="Segoe UI Semilight" panose="020B0402040204020203" pitchFamily="34" charset="0"/>
+              </a:rPr>
+              <a:t> מכמה מחשבים שונים בו-זמנית.</a:t>
+            </a:r>
+          </a:p>
+          <a:p>
+            <a:pPr lvl="1" algn="r" rtl="1"/>
+            <a:r>
+              <a:rPr lang="he-IL" dirty="0">
+                <a:latin typeface="Segoe UI Semilight" panose="020B0402040204020203" pitchFamily="34" charset="0"/>
+                <a:cs typeface="Segoe UI Semilight" panose="020B0402040204020203" pitchFamily="34" charset="0"/>
+              </a:rPr>
+              <a:t>לרוב ע"י רשת מחשבים הנקראית </a:t>
+            </a:r>
+            <a:r>
+              <a:rPr lang="en-US" dirty="0">
+                <a:latin typeface="Segoe UI Semilight" panose="020B0402040204020203" pitchFamily="34" charset="0"/>
+                <a:cs typeface="Segoe UI Semilight" panose="020B0402040204020203" pitchFamily="34" charset="0"/>
+              </a:rPr>
+              <a:t>botnet</a:t>
+            </a:r>
+            <a:r>
+              <a:rPr lang="he-IL" dirty="0">
+                <a:latin typeface="Segoe UI Semilight" panose="020B0402040204020203" pitchFamily="34" charset="0"/>
+                <a:cs typeface="Segoe UI Semilight" panose="020B0402040204020203" pitchFamily="34" charset="0"/>
+              </a:rPr>
+              <a:t> הנשלטת ע"י התוקף.</a:t>
+            </a:r>
+          </a:p>
+          <a:p>
+            <a:pPr algn="r" rtl="1"/>
+            <a:r>
+              <a:rPr lang="en-US" dirty="0" err="1">
+                <a:latin typeface="Segoe UI Semilight" panose="020B0402040204020203" pitchFamily="34" charset="0"/>
+                <a:cs typeface="Segoe UI Semilight" panose="020B0402040204020203" pitchFamily="34" charset="0"/>
+              </a:rPr>
+              <a:t>DRDoS</a:t>
+            </a:r>
+            <a:endParaRPr lang="he-IL" dirty="0">
+              <a:latin typeface="Segoe UI Semilight" panose="020B0402040204020203" pitchFamily="34" charset="0"/>
+              <a:cs typeface="Segoe UI Semilight" panose="020B0402040204020203" pitchFamily="34" charset="0"/>
+            </a:endParaRPr>
+          </a:p>
+          <a:p>
+            <a:pPr lvl="1" algn="r" rtl="1"/>
+            <a:r>
+              <a:rPr lang="en-US" dirty="0">
+                <a:latin typeface="Segoe UI Semilight" panose="020B0402040204020203" pitchFamily="34" charset="0"/>
+                <a:cs typeface="Segoe UI Semilight" panose="020B0402040204020203" pitchFamily="34" charset="0"/>
+              </a:rPr>
+              <a:t>Distributed Reflected Denial Of Service</a:t>
+            </a:r>
+            <a:endParaRPr lang="he-IL" dirty="0">
+              <a:latin typeface="Segoe UI Semilight" panose="020B0402040204020203" pitchFamily="34" charset="0"/>
+              <a:cs typeface="Segoe UI Semilight" panose="020B0402040204020203" pitchFamily="34" charset="0"/>
+            </a:endParaRPr>
+          </a:p>
+          <a:p>
+            <a:pPr lvl="1" algn="r" rtl="1"/>
+            <a:r>
+              <a:rPr lang="he-IL" dirty="0">
+                <a:latin typeface="Segoe UI Semilight" panose="020B0402040204020203" pitchFamily="34" charset="0"/>
+                <a:cs typeface="Segoe UI Semilight" panose="020B0402040204020203" pitchFamily="34" charset="0"/>
+              </a:rPr>
+              <a:t>ביצוע </a:t>
+            </a:r>
+            <a:r>
+              <a:rPr lang="en-US" dirty="0">
+                <a:latin typeface="Segoe UI Semilight" panose="020B0402040204020203" pitchFamily="34" charset="0"/>
+                <a:cs typeface="Segoe UI Semilight" panose="020B0402040204020203" pitchFamily="34" charset="0"/>
+              </a:rPr>
+              <a:t>DDoS</a:t>
+            </a:r>
+            <a:r>
+              <a:rPr lang="he-IL" dirty="0">
+                <a:latin typeface="Segoe UI Semilight" panose="020B0402040204020203" pitchFamily="34" charset="0"/>
+                <a:cs typeface="Segoe UI Semilight" panose="020B0402040204020203" pitchFamily="34" charset="0"/>
+              </a:rPr>
+              <a:t> תוך שימוש בפרוטוקולים ושירותים הקיימים ברשת בשביל להגדיל את כמות המידע הנשלחת לשרת.</a:t>
+            </a:r>
+          </a:p>
+          <a:p>
+            <a:pPr lvl="1" algn="r" rtl="1"/>
+            <a:endParaRPr lang="he-IL" dirty="0">
+              <a:latin typeface="Segoe UI Semilight" panose="020B0402040204020203" pitchFamily="34" charset="0"/>
+              <a:cs typeface="Segoe UI Semilight" panose="020B0402040204020203" pitchFamily="34" charset="0"/>
+            </a:endParaRPr>
+          </a:p>
+          <a:p>
+            <a:pPr algn="r" rtl="1"/>
+            <a:endParaRPr lang="en-US" dirty="0">
+              <a:latin typeface="Segoe UI Semilight" panose="020B0402040204020203" pitchFamily="34" charset="0"/>
+              <a:cs typeface="Segoe UI Semilight" panose="020B0402040204020203" pitchFamily="34" charset="0"/>
+            </a:endParaRPr>
+          </a:p>
+          <a:p>
+            <a:pPr algn="r" rtl="1"/>
+            <a:endParaRPr lang="he-IL" dirty="0">
+              <a:latin typeface="Segoe UI Semilight" panose="020B0402040204020203" pitchFamily="34" charset="0"/>
+              <a:cs typeface="Segoe UI Semilight" panose="020B0402040204020203" pitchFamily="34" charset="0"/>
+            </a:endParaRPr>
+          </a:p>
+          <a:p>
+            <a:pPr algn="r" rtl="1"/>
+            <a:endParaRPr lang="he-IL" dirty="0">
+              <a:latin typeface="Segoe UI Semilight" panose="020B0402040204020203" pitchFamily="34" charset="0"/>
+              <a:cs typeface="Segoe UI Semilight" panose="020B0402040204020203" pitchFamily="34" charset="0"/>
+            </a:endParaRPr>
+          </a:p>
+          <a:p>
+            <a:pPr algn="r" rtl="1"/>
+            <a:endParaRPr lang="he-IL" dirty="0">
+              <a:latin typeface="Segoe UI Semilight" panose="020B0402040204020203" pitchFamily="34" charset="0"/>
+              <a:cs typeface="Segoe UI Semilight" panose="020B0402040204020203" pitchFamily="34" charset="0"/>
+            </a:endParaRPr>
+          </a:p>
+          <a:p>
+            <a:pPr algn="r" rtl="1"/>
+            <a:endParaRPr lang="he-IL" dirty="0">
+              <a:latin typeface="Segoe UI Semilight" panose="020B0402040204020203" pitchFamily="34" charset="0"/>
+              <a:cs typeface="Segoe UI Semilight" panose="020B0402040204020203" pitchFamily="34" charset="0"/>
+            </a:endParaRPr>
+          </a:p>
+          <a:p>
+            <a:pPr lvl="1" algn="r" rtl="1"/>
+            <a:endParaRPr lang="he-IL" dirty="0">
+              <a:latin typeface="Segoe UI Semilight" panose="020B0402040204020203" pitchFamily="34" charset="0"/>
+              <a:cs typeface="Segoe UI Semilight" panose="020B0402040204020203" pitchFamily="34" charset="0"/>
+            </a:endParaRPr>
+          </a:p>
+        </p:txBody>
+      </p:sp>
+      <p:pic>
+        <p:nvPicPr>
+          <p:cNvPr id="5122" name="Picture 2" descr="To launch DDoS attacks, attackers use botnets">
+            <a:extLst>
+              <a:ext uri="{FF2B5EF4-FFF2-40B4-BE49-F238E27FC236}">
+                <a16:creationId xmlns:a16="http://schemas.microsoft.com/office/drawing/2014/main" id="{14E90EED-FA6F-48BC-A533-33443C540B5F}"/>
+              </a:ext>
+            </a:extLst>
+          </p:cNvPr>
+          <p:cNvPicPr>
+            <a:picLocks noChangeAspect="1" noChangeArrowheads="1"/>
+          </p:cNvPicPr>
+          <p:nvPr/>
+        </p:nvPicPr>
+        <p:blipFill>
+          <a:blip r:embed="rId3">
+            <a:extLst>
+              <a:ext uri="{28A0092B-C50C-407E-A947-70E740481C1C}">
+                <a14:useLocalDpi xmlns:a14="http://schemas.microsoft.com/office/drawing/2010/main" val="0"/>
+              </a:ext>
+            </a:extLst>
+          </a:blip>
+          <a:srcRect/>
+          <a:stretch>
+            <a:fillRect/>
+          </a:stretch>
+        </p:blipFill>
+        <p:spPr bwMode="auto">
+          <a:xfrm>
+            <a:off x="153030" y="595851"/>
+            <a:ext cx="4502716" cy="2862233"/>
+          </a:xfrm>
+          <a:prstGeom prst="rect">
+            <a:avLst/>
+          </a:prstGeom>
+          <a:noFill/>
+          <a:extLst>
+            <a:ext uri="{909E8E84-426E-40DD-AFC4-6F175D3DCCD1}">
+              <a14:hiddenFill xmlns:a14="http://schemas.microsoft.com/office/drawing/2010/main">
+                <a:solidFill>
+                  <a:srgbClr val="FFFFFF"/>
+                </a:solidFill>
+              </a14:hiddenFill>
+            </a:ext>
+          </a:extLst>
+        </p:spPr>
+      </p:pic>
+      <p:pic>
+        <p:nvPicPr>
+          <p:cNvPr id="5124" name="Picture 4" descr="10 DNS Attacks Types and The Mitigate Steps - 2020">
+            <a:extLst>
+              <a:ext uri="{FF2B5EF4-FFF2-40B4-BE49-F238E27FC236}">
+                <a16:creationId xmlns:a16="http://schemas.microsoft.com/office/drawing/2014/main" id="{5275186D-453B-4983-AC24-2A7A08E193AC}"/>
+              </a:ext>
+            </a:extLst>
+          </p:cNvPr>
+          <p:cNvPicPr>
+            <a:picLocks noChangeAspect="1" noChangeArrowheads="1"/>
+          </p:cNvPicPr>
+          <p:nvPr/>
+        </p:nvPicPr>
+        <p:blipFill>
+          <a:blip r:embed="rId4">
+            <a:extLst>
+              <a:ext uri="{28A0092B-C50C-407E-A947-70E740481C1C}">
+                <a14:useLocalDpi xmlns:a14="http://schemas.microsoft.com/office/drawing/2010/main" val="0"/>
+              </a:ext>
+            </a:extLst>
+          </a:blip>
+          <a:srcRect/>
+          <a:stretch>
+            <a:fillRect/>
+          </a:stretch>
+        </p:blipFill>
+        <p:spPr bwMode="auto">
+          <a:xfrm>
+            <a:off x="394901" y="4038419"/>
+            <a:ext cx="3766553" cy="2362382"/>
+          </a:xfrm>
+          <a:prstGeom prst="rect">
+            <a:avLst/>
+          </a:prstGeom>
+          <a:noFill/>
+          <a:extLst>
+            <a:ext uri="{909E8E84-426E-40DD-AFC4-6F175D3DCCD1}">
+              <a14:hiddenFill xmlns:a14="http://schemas.microsoft.com/office/drawing/2010/main">
+                <a:solidFill>
+                  <a:srgbClr val="FFFFFF"/>
+                </a:solidFill>
+              </a14:hiddenFill>
+            </a:ext>
+          </a:extLst>
+        </p:spPr>
+      </p:pic>
+    </p:spTree>
+    <p:extLst>
+      <p:ext uri="{BB962C8B-B14F-4D97-AF65-F5344CB8AC3E}">
+        <p14:creationId xmlns:p14="http://schemas.microsoft.com/office/powerpoint/2010/main" val="1714393310"/>
+      </p:ext>
+    </p:extLst>
+  </p:cSld>
+  <p:clrMapOvr>
+    <a:masterClrMapping/>
+  </p:clrMapOvr>
+  <mc:AlternateContent xmlns:mc="http://schemas.openxmlformats.org/markup-compatibility/2006" xmlns:p14="http://schemas.microsoft.com/office/powerpoint/2010/main">
+    <mc:Choice Requires="p14">
+      <p:transition spd="slow" p14:dur="2000" advClick="0"/>
+    </mc:Choice>
+    <mc:Fallback xmlns="">
+      <p:transition spd="slow" advClick="0"/>
+    </mc:Fallback>
+  </mc:AlternateContent>
+</p:sld>
+</file>
+
+<file path=ppt/slides/slide34.xml><?xml version="1.0" encoding="utf-8"?>
+<p:sld xmlns:a="http://schemas.openxmlformats.org/drawingml/2006/main" xmlns:r="http://schemas.openxmlformats.org/officeDocument/2006/relationships" xmlns:p="http://schemas.openxmlformats.org/presentationml/2006/main">
+  <p:cSld>
+    <p:spTree>
+      <p:nvGrpSpPr>
+        <p:cNvPr id="1" name=""/>
+        <p:cNvGrpSpPr/>
+        <p:nvPr/>
+      </p:nvGrpSpPr>
+      <p:grpSpPr>
+        <a:xfrm>
+          <a:off x="0" y="0"/>
+          <a:ext cx="0" cy="0"/>
+          <a:chOff x="0" y="0"/>
+          <a:chExt cx="0" cy="0"/>
+        </a:xfrm>
+      </p:grpSpPr>
+      <p:sp>
+        <p:nvSpPr>
+          <p:cNvPr id="27" name="Rectangle 26">
+            <a:extLst>
+              <a:ext uri="{FF2B5EF4-FFF2-40B4-BE49-F238E27FC236}">
+                <a16:creationId xmlns:a16="http://schemas.microsoft.com/office/drawing/2014/main" id="{64C76D42-2200-4A13-AFFB-0F543F6A81AE}"/>
+              </a:ext>
+            </a:extLst>
+          </p:cNvPr>
+          <p:cNvSpPr/>
+          <p:nvPr/>
+        </p:nvSpPr>
+        <p:spPr>
+          <a:xfrm>
+            <a:off x="5741776" y="171465"/>
+            <a:ext cx="5361617" cy="664803"/>
+          </a:xfrm>
+          <a:prstGeom prst="rect">
+            <a:avLst/>
+          </a:prstGeom>
+        </p:spPr>
+        <p:style>
+          <a:lnRef idx="1">
+            <a:schemeClr val="accent5"/>
+          </a:lnRef>
+          <a:fillRef idx="2">
+            <a:schemeClr val="accent5"/>
+          </a:fillRef>
+          <a:effectRef idx="1">
+            <a:schemeClr val="accent5"/>
+          </a:effectRef>
+          <a:fontRef idx="minor">
+            <a:schemeClr val="dk1"/>
+          </a:fontRef>
+        </p:style>
+        <p:txBody>
+          <a:bodyPr rtlCol="0" anchor="ctr"/>
+          <a:lstStyle/>
+          <a:p>
+            <a:pPr algn="ctr"/>
+            <a:endParaRPr lang="en-IL" dirty="0"/>
+          </a:p>
+        </p:txBody>
+      </p:sp>
+      <p:sp>
+        <p:nvSpPr>
+          <p:cNvPr id="2" name="Title 1">
+            <a:extLst>
+              <a:ext uri="{FF2B5EF4-FFF2-40B4-BE49-F238E27FC236}">
+                <a16:creationId xmlns:a16="http://schemas.microsoft.com/office/drawing/2014/main" id="{AD92F597-4DB6-45C7-97B2-8F408617D08A}"/>
+              </a:ext>
+            </a:extLst>
+          </p:cNvPr>
+          <p:cNvSpPr>
+            <a:spLocks noGrp="1"/>
+          </p:cNvSpPr>
+          <p:nvPr>
+            <p:ph type="title"/>
+          </p:nvPr>
+        </p:nvSpPr>
+        <p:spPr>
+          <a:xfrm>
+            <a:off x="1141412" y="0"/>
+            <a:ext cx="9905998" cy="983635"/>
+          </a:xfrm>
+        </p:spPr>
+        <p:txBody>
+          <a:bodyPr/>
+          <a:lstStyle/>
+          <a:p>
+            <a:pPr algn="r" rtl="1"/>
+            <a:r>
+              <a:rPr lang="he-IL" cap="none" dirty="0">
+                <a:solidFill>
+                  <a:schemeClr val="bg1"/>
+                </a:solidFill>
+                <a:latin typeface="Segoe UI Semibold" panose="020B0702040204020203" pitchFamily="34" charset="0"/>
+                <a:cs typeface="Segoe UI Semibold" panose="020B0702040204020203" pitchFamily="34" charset="0"/>
+              </a:rPr>
+              <a:t>הגנות</a:t>
+            </a:r>
+            <a:endParaRPr lang="en-IL" cap="none" dirty="0">
+              <a:solidFill>
+                <a:schemeClr val="bg1"/>
+              </a:solidFill>
+              <a:latin typeface="Segoe UI Semibold" panose="020B0702040204020203" pitchFamily="34" charset="0"/>
+              <a:cs typeface="Segoe UI Semibold" panose="020B0702040204020203" pitchFamily="34" charset="0"/>
+            </a:endParaRPr>
+          </a:p>
+        </p:txBody>
+      </p:sp>
+      <p:sp>
+        <p:nvSpPr>
+          <p:cNvPr id="3" name="Content Placeholder 2">
+            <a:extLst>
+              <a:ext uri="{FF2B5EF4-FFF2-40B4-BE49-F238E27FC236}">
+                <a16:creationId xmlns:a16="http://schemas.microsoft.com/office/drawing/2014/main" id="{5DB99D37-3B94-4415-BFED-4639A5DB97A4}"/>
+              </a:ext>
+            </a:extLst>
+          </p:cNvPr>
+          <p:cNvSpPr>
+            <a:spLocks noGrp="1"/>
+          </p:cNvSpPr>
+          <p:nvPr>
+            <p:ph idx="1"/>
+          </p:nvPr>
+        </p:nvSpPr>
+        <p:spPr>
+          <a:xfrm>
+            <a:off x="472751" y="802432"/>
+            <a:ext cx="10574659" cy="5822304"/>
+          </a:xfrm>
+        </p:spPr>
+        <p:txBody>
+          <a:bodyPr>
+            <a:normAutofit/>
+          </a:bodyPr>
+          <a:lstStyle/>
+          <a:p>
+            <a:pPr algn="r" rtl="1"/>
+            <a:r>
+              <a:rPr lang="en-US" dirty="0">
+                <a:latin typeface="Segoe UI Semilight" panose="020B0402040204020203" pitchFamily="34" charset="0"/>
+                <a:cs typeface="Segoe UI Semilight" panose="020B0402040204020203" pitchFamily="34" charset="0"/>
+              </a:rPr>
+              <a:t>Firewalls</a:t>
+            </a:r>
+            <a:endParaRPr lang="he-IL" dirty="0">
+              <a:latin typeface="Segoe UI Semilight" panose="020B0402040204020203" pitchFamily="34" charset="0"/>
+              <a:cs typeface="Segoe UI Semilight" panose="020B0402040204020203" pitchFamily="34" charset="0"/>
+            </a:endParaRPr>
+          </a:p>
+          <a:p>
+            <a:pPr lvl="1" algn="r" rtl="1"/>
+            <a:r>
+              <a:rPr lang="en-US" dirty="0">
+                <a:latin typeface="Segoe UI Semilight" panose="020B0402040204020203" pitchFamily="34" charset="0"/>
+                <a:cs typeface="Segoe UI Semilight" panose="020B0402040204020203" pitchFamily="34" charset="0"/>
+              </a:rPr>
+              <a:t>Network Monitoring</a:t>
+            </a:r>
+          </a:p>
+          <a:p>
+            <a:pPr lvl="1" algn="r" rtl="1"/>
+            <a:r>
+              <a:rPr lang="en-US" dirty="0">
+                <a:latin typeface="Segoe UI Semilight" panose="020B0402040204020203" pitchFamily="34" charset="0"/>
+                <a:cs typeface="Segoe UI Semilight" panose="020B0402040204020203" pitchFamily="34" charset="0"/>
+              </a:rPr>
+              <a:t>Deep Packet Inspection</a:t>
+            </a:r>
+            <a:endParaRPr lang="he-IL" dirty="0">
+              <a:latin typeface="Segoe UI Semilight" panose="020B0402040204020203" pitchFamily="34" charset="0"/>
+              <a:cs typeface="Segoe UI Semilight" panose="020B0402040204020203" pitchFamily="34" charset="0"/>
+            </a:endParaRPr>
+          </a:p>
+          <a:p>
+            <a:pPr lvl="1" algn="r" rtl="1"/>
+            <a:endParaRPr lang="he-IL" dirty="0">
+              <a:latin typeface="Segoe UI Semilight" panose="020B0402040204020203" pitchFamily="34" charset="0"/>
+              <a:cs typeface="Segoe UI Semilight" panose="020B0402040204020203" pitchFamily="34" charset="0"/>
+            </a:endParaRPr>
+          </a:p>
+          <a:p>
+            <a:pPr algn="r" rtl="1"/>
+            <a:r>
+              <a:rPr lang="he-IL" dirty="0">
+                <a:latin typeface="Segoe UI Semilight" panose="020B0402040204020203" pitchFamily="34" charset="0"/>
+                <a:cs typeface="Segoe UI Semilight" panose="020B0402040204020203" pitchFamily="34" charset="0"/>
+              </a:rPr>
+              <a:t>חברות מסחריות</a:t>
+            </a:r>
+          </a:p>
+          <a:p>
+            <a:pPr lvl="1" algn="r" rtl="1"/>
+            <a:r>
+              <a:rPr lang="he-IL" dirty="0">
+                <a:latin typeface="Segoe UI Semilight" panose="020B0402040204020203" pitchFamily="34" charset="0"/>
+                <a:cs typeface="Segoe UI Semilight" panose="020B0402040204020203" pitchFamily="34" charset="0"/>
+              </a:rPr>
+              <a:t>השכרת שירותים של חברות גדולות עבור הגנות מפני </a:t>
+            </a:r>
+            <a:r>
+              <a:rPr lang="en-US" dirty="0">
+                <a:latin typeface="Segoe UI Semilight" panose="020B0402040204020203" pitchFamily="34" charset="0"/>
+                <a:cs typeface="Segoe UI Semilight" panose="020B0402040204020203" pitchFamily="34" charset="0"/>
+              </a:rPr>
+              <a:t>DDoS</a:t>
+            </a:r>
+            <a:endParaRPr lang="he-IL" dirty="0">
+              <a:latin typeface="Segoe UI Semilight" panose="020B0402040204020203" pitchFamily="34" charset="0"/>
+              <a:cs typeface="Segoe UI Semilight" panose="020B0402040204020203" pitchFamily="34" charset="0"/>
+            </a:endParaRPr>
+          </a:p>
+          <a:p>
+            <a:pPr lvl="1" algn="r" rtl="1"/>
+            <a:r>
+              <a:rPr lang="he-IL" dirty="0">
+                <a:latin typeface="Segoe UI Semilight" panose="020B0402040204020203" pitchFamily="34" charset="0"/>
+                <a:cs typeface="Segoe UI Semilight" panose="020B0402040204020203" pitchFamily="34" charset="0"/>
+              </a:rPr>
+              <a:t>בשביל להעמיס על שרתים של חברות כאלו צריך כמות עצומה של תעבורה...</a:t>
+            </a:r>
+            <a:endParaRPr lang="en-US" dirty="0">
+              <a:latin typeface="Segoe UI Semilight" panose="020B0402040204020203" pitchFamily="34" charset="0"/>
+              <a:cs typeface="Segoe UI Semilight" panose="020B0402040204020203" pitchFamily="34" charset="0"/>
+            </a:endParaRPr>
+          </a:p>
+          <a:p>
+            <a:pPr lvl="1" algn="r" rtl="1"/>
+            <a:endParaRPr lang="en-US" dirty="0">
+              <a:latin typeface="Segoe UI Semilight" panose="020B0402040204020203" pitchFamily="34" charset="0"/>
+              <a:cs typeface="Segoe UI Semilight" panose="020B0402040204020203" pitchFamily="34" charset="0"/>
+            </a:endParaRPr>
+          </a:p>
+          <a:p>
+            <a:pPr lvl="1" algn="r" rtl="1"/>
+            <a:endParaRPr lang="he-IL" dirty="0">
+              <a:latin typeface="Segoe UI Semilight" panose="020B0402040204020203" pitchFamily="34" charset="0"/>
+              <a:cs typeface="Segoe UI Semilight" panose="020B0402040204020203" pitchFamily="34" charset="0"/>
+            </a:endParaRPr>
+          </a:p>
+          <a:p>
+            <a:pPr lvl="1" algn="r" rtl="1"/>
+            <a:endParaRPr lang="he-IL" dirty="0">
+              <a:latin typeface="Segoe UI Semilight" panose="020B0402040204020203" pitchFamily="34" charset="0"/>
+              <a:cs typeface="Segoe UI Semilight" panose="020B0402040204020203" pitchFamily="34" charset="0"/>
+            </a:endParaRPr>
+          </a:p>
+          <a:p>
+            <a:pPr algn="r" rtl="1"/>
+            <a:endParaRPr lang="en-US" dirty="0">
+              <a:latin typeface="Segoe UI Semilight" panose="020B0402040204020203" pitchFamily="34" charset="0"/>
+              <a:cs typeface="Segoe UI Semilight" panose="020B0402040204020203" pitchFamily="34" charset="0"/>
+            </a:endParaRPr>
+          </a:p>
+          <a:p>
+            <a:pPr algn="r" rtl="1"/>
+            <a:endParaRPr lang="he-IL" dirty="0">
+              <a:latin typeface="Segoe UI Semilight" panose="020B0402040204020203" pitchFamily="34" charset="0"/>
+              <a:cs typeface="Segoe UI Semilight" panose="020B0402040204020203" pitchFamily="34" charset="0"/>
+            </a:endParaRPr>
+          </a:p>
+          <a:p>
+            <a:pPr algn="r" rtl="1"/>
+            <a:endParaRPr lang="he-IL" dirty="0">
+              <a:latin typeface="Segoe UI Semilight" panose="020B0402040204020203" pitchFamily="34" charset="0"/>
+              <a:cs typeface="Segoe UI Semilight" panose="020B0402040204020203" pitchFamily="34" charset="0"/>
+            </a:endParaRPr>
+          </a:p>
+          <a:p>
+            <a:pPr algn="r" rtl="1"/>
+            <a:endParaRPr lang="he-IL" dirty="0">
+              <a:latin typeface="Segoe UI Semilight" panose="020B0402040204020203" pitchFamily="34" charset="0"/>
+              <a:cs typeface="Segoe UI Semilight" panose="020B0402040204020203" pitchFamily="34" charset="0"/>
+            </a:endParaRPr>
+          </a:p>
+          <a:p>
+            <a:pPr algn="r" rtl="1"/>
+            <a:endParaRPr lang="he-IL" dirty="0">
+              <a:latin typeface="Segoe UI Semilight" panose="020B0402040204020203" pitchFamily="34" charset="0"/>
+              <a:cs typeface="Segoe UI Semilight" panose="020B0402040204020203" pitchFamily="34" charset="0"/>
+            </a:endParaRPr>
+          </a:p>
+          <a:p>
+            <a:pPr lvl="1" algn="r" rtl="1"/>
+            <a:endParaRPr lang="he-IL" dirty="0">
+              <a:latin typeface="Segoe UI Semilight" panose="020B0402040204020203" pitchFamily="34" charset="0"/>
+              <a:cs typeface="Segoe UI Semilight" panose="020B0402040204020203" pitchFamily="34" charset="0"/>
+            </a:endParaRPr>
+          </a:p>
+        </p:txBody>
+      </p:sp>
+    </p:spTree>
+    <p:extLst>
+      <p:ext uri="{BB962C8B-B14F-4D97-AF65-F5344CB8AC3E}">
+        <p14:creationId xmlns:p14="http://schemas.microsoft.com/office/powerpoint/2010/main" val="2203890961"/>
+      </p:ext>
+    </p:extLst>
+  </p:cSld>
+  <p:clrMapOvr>
+    <a:masterClrMapping/>
+  </p:clrMapOvr>
+  <mc:AlternateContent xmlns:mc="http://schemas.openxmlformats.org/markup-compatibility/2006" xmlns:p14="http://schemas.microsoft.com/office/powerpoint/2010/main">
+    <mc:Choice Requires="p14">
+      <p:transition spd="slow" p14:dur="2000" advClick="0"/>
+    </mc:Choice>
+    <mc:Fallback xmlns="">
+      <p:transition spd="slow" advClick="0"/>
+    </mc:Fallback>
+  </mc:AlternateContent>
+</p:sld>
+</file>
+
+<file path=ppt/slides/slide35.xml><?xml version="1.0" encoding="utf-8"?>
+<p:sld xmlns:a="http://schemas.openxmlformats.org/drawingml/2006/main" xmlns:r="http://schemas.openxmlformats.org/officeDocument/2006/relationships" xmlns:p="http://schemas.openxmlformats.org/presentationml/2006/main">
+  <p:cSld>
+    <p:spTree>
+      <p:nvGrpSpPr>
+        <p:cNvPr id="1" name=""/>
+        <p:cNvGrpSpPr/>
+        <p:nvPr/>
+      </p:nvGrpSpPr>
+      <p:grpSpPr>
+        <a:xfrm>
+          <a:off x="0" y="0"/>
+          <a:ext cx="0" cy="0"/>
+          <a:chOff x="0" y="0"/>
+          <a:chExt cx="0" cy="0"/>
+        </a:xfrm>
+      </p:grpSpPr>
       <p:sp useBgFill="1">
         <p:nvSpPr>
           <p:cNvPr id="139" name="Rectangle 138">

</xml_diff>